<commit_message>
PULL UP Fritz 추가
</commit_message>
<xml_diff>
--- a/Week04.pptx
+++ b/Week04.pptx
@@ -12,19 +12,19 @@
     <p:sldId id="260" r:id="rId3"/>
     <p:sldId id="261" r:id="rId4"/>
     <p:sldId id="285" r:id="rId5"/>
-    <p:sldId id="287" r:id="rId6"/>
-    <p:sldId id="282" r:id="rId7"/>
-    <p:sldId id="289" r:id="rId8"/>
-    <p:sldId id="288" r:id="rId9"/>
-    <p:sldId id="290" r:id="rId10"/>
-    <p:sldId id="283" r:id="rId11"/>
-    <p:sldId id="303" r:id="rId12"/>
-    <p:sldId id="291" r:id="rId13"/>
-    <p:sldId id="304" r:id="rId14"/>
-    <p:sldId id="262" r:id="rId15"/>
-    <p:sldId id="294" r:id="rId16"/>
-    <p:sldId id="305" r:id="rId17"/>
-    <p:sldId id="292" r:id="rId18"/>
+    <p:sldId id="282" r:id="rId6"/>
+    <p:sldId id="289" r:id="rId7"/>
+    <p:sldId id="288" r:id="rId8"/>
+    <p:sldId id="290" r:id="rId9"/>
+    <p:sldId id="283" r:id="rId10"/>
+    <p:sldId id="303" r:id="rId11"/>
+    <p:sldId id="291" r:id="rId12"/>
+    <p:sldId id="304" r:id="rId13"/>
+    <p:sldId id="262" r:id="rId14"/>
+    <p:sldId id="294" r:id="rId15"/>
+    <p:sldId id="305" r:id="rId16"/>
+    <p:sldId id="292" r:id="rId17"/>
+    <p:sldId id="306" r:id="rId18"/>
     <p:sldId id="295" r:id="rId19"/>
     <p:sldId id="293" r:id="rId20"/>
     <p:sldId id="298" r:id="rId21"/>
@@ -230,7 +230,7 @@
           <a:p>
             <a:fld id="{65694B03-ACCE-4F3B-8CA1-4A1F2158852F}" type="datetimeFigureOut">
               <a:rPr lang="ko-KR" altLang="en-US" smtClean="0"/>
-              <a:t>2019-03-21</a:t>
+              <a:t>2019. 3. 21.</a:t>
             </a:fld>
             <a:endParaRPr lang="ko-KR" altLang="en-US"/>
           </a:p>
@@ -628,7 +628,7 @@
           <a:p>
             <a:fld id="{DC40DB95-99D2-4A51-95E2-C065FB3047F2}" type="datetimeFigureOut">
               <a:rPr lang="ko-KR" altLang="en-US" smtClean="0"/>
-              <a:t>2019-03-21</a:t>
+              <a:t>2019. 3. 21.</a:t>
             </a:fld>
             <a:endParaRPr lang="ko-KR" altLang="en-US"/>
           </a:p>
@@ -798,7 +798,7 @@
           <a:p>
             <a:fld id="{DC40DB95-99D2-4A51-95E2-C065FB3047F2}" type="datetimeFigureOut">
               <a:rPr lang="ko-KR" altLang="en-US" smtClean="0"/>
-              <a:t>2019-03-21</a:t>
+              <a:t>2019. 3. 21.</a:t>
             </a:fld>
             <a:endParaRPr lang="ko-KR" altLang="en-US"/>
           </a:p>
@@ -978,7 +978,7 @@
           <a:p>
             <a:fld id="{DC40DB95-99D2-4A51-95E2-C065FB3047F2}" type="datetimeFigureOut">
               <a:rPr lang="ko-KR" altLang="en-US" smtClean="0"/>
-              <a:t>2019-03-21</a:t>
+              <a:t>2019. 3. 21.</a:t>
             </a:fld>
             <a:endParaRPr lang="ko-KR" altLang="en-US"/>
           </a:p>
@@ -1186,7 +1186,7 @@
           <a:p>
             <a:fld id="{DC40DB95-99D2-4A51-95E2-C065FB3047F2}" type="datetimeFigureOut">
               <a:rPr lang="ko-KR" altLang="en-US" smtClean="0"/>
-              <a:t>2019-03-21</a:t>
+              <a:t>2019. 3. 21.</a:t>
             </a:fld>
             <a:endParaRPr lang="ko-KR" altLang="en-US"/>
           </a:p>
@@ -1430,7 +1430,7 @@
           <a:p>
             <a:fld id="{DC40DB95-99D2-4A51-95E2-C065FB3047F2}" type="datetimeFigureOut">
               <a:rPr lang="ko-KR" altLang="en-US" smtClean="0"/>
-              <a:t>2019-03-21</a:t>
+              <a:t>2019. 3. 21.</a:t>
             </a:fld>
             <a:endParaRPr lang="ko-KR" altLang="en-US"/>
           </a:p>
@@ -1662,7 +1662,7 @@
           <a:p>
             <a:fld id="{DC40DB95-99D2-4A51-95E2-C065FB3047F2}" type="datetimeFigureOut">
               <a:rPr lang="ko-KR" altLang="en-US" smtClean="0"/>
-              <a:t>2019-03-21</a:t>
+              <a:t>2019. 3. 21.</a:t>
             </a:fld>
             <a:endParaRPr lang="ko-KR" altLang="en-US"/>
           </a:p>
@@ -2029,7 +2029,7 @@
           <a:p>
             <a:fld id="{DC40DB95-99D2-4A51-95E2-C065FB3047F2}" type="datetimeFigureOut">
               <a:rPr lang="ko-KR" altLang="en-US" smtClean="0"/>
-              <a:t>2019-03-21</a:t>
+              <a:t>2019. 3. 21.</a:t>
             </a:fld>
             <a:endParaRPr lang="ko-KR" altLang="en-US"/>
           </a:p>
@@ -2147,7 +2147,7 @@
           <a:p>
             <a:fld id="{DC40DB95-99D2-4A51-95E2-C065FB3047F2}" type="datetimeFigureOut">
               <a:rPr lang="ko-KR" altLang="en-US" smtClean="0"/>
-              <a:t>2019-03-21</a:t>
+              <a:t>2019. 3. 21.</a:t>
             </a:fld>
             <a:endParaRPr lang="ko-KR" altLang="en-US"/>
           </a:p>
@@ -2242,7 +2242,7 @@
           <a:p>
             <a:fld id="{DC40DB95-99D2-4A51-95E2-C065FB3047F2}" type="datetimeFigureOut">
               <a:rPr lang="ko-KR" altLang="en-US" smtClean="0"/>
-              <a:t>2019-03-21</a:t>
+              <a:t>2019. 3. 21.</a:t>
             </a:fld>
             <a:endParaRPr lang="ko-KR" altLang="en-US"/>
           </a:p>
@@ -2519,7 +2519,7 @@
           <a:p>
             <a:fld id="{DC40DB95-99D2-4A51-95E2-C065FB3047F2}" type="datetimeFigureOut">
               <a:rPr lang="ko-KR" altLang="en-US" smtClean="0"/>
-              <a:t>2019-03-21</a:t>
+              <a:t>2019. 3. 21.</a:t>
             </a:fld>
             <a:endParaRPr lang="ko-KR" altLang="en-US"/>
           </a:p>
@@ -2776,7 +2776,7 @@
           <a:p>
             <a:fld id="{DC40DB95-99D2-4A51-95E2-C065FB3047F2}" type="datetimeFigureOut">
               <a:rPr lang="ko-KR" altLang="en-US" smtClean="0"/>
-              <a:t>2019-03-21</a:t>
+              <a:t>2019. 3. 21.</a:t>
             </a:fld>
             <a:endParaRPr lang="ko-KR" altLang="en-US"/>
           </a:p>
@@ -2989,7 +2989,7 @@
           <a:p>
             <a:fld id="{DC40DB95-99D2-4A51-95E2-C065FB3047F2}" type="datetimeFigureOut">
               <a:rPr lang="ko-KR" altLang="en-US" smtClean="0"/>
-              <a:t>2019-03-21</a:t>
+              <a:t>2019. 3. 21.</a:t>
             </a:fld>
             <a:endParaRPr lang="ko-KR" altLang="en-US"/>
           </a:p>
@@ -3514,346 +3514,6 @@
         </p:nvSpPr>
         <p:spPr>
           <a:xfrm>
-            <a:off x="82128" y="1130212"/>
-            <a:ext cx="8239125" cy="1318121"/>
-          </a:xfrm>
-          <a:prstGeom prst="rect">
-            <a:avLst/>
-          </a:prstGeom>
-        </p:spPr>
-        <p:txBody>
-          <a:bodyPr/>
-          <a:lstStyle>
-            <a:lvl1pPr marL="228600" indent="-228600" algn="l" defTabSz="914400" rtl="0" eaLnBrk="1" latinLnBrk="1" hangingPunct="1">
-              <a:lnSpc>
-                <a:spcPct val="90000"/>
-              </a:lnSpc>
-              <a:spcBef>
-                <a:spcPts val="1000"/>
-              </a:spcBef>
-              <a:buFont typeface="Arial" panose="020B0604020202020204" pitchFamily="34" charset="0"/>
-              <a:buChar char="•"/>
-              <a:defRPr sz="2800" kern="1200">
-                <a:solidFill>
-                  <a:schemeClr val="tx1"/>
-                </a:solidFill>
-                <a:latin typeface="+mn-lt"/>
-                <a:ea typeface="+mn-ea"/>
-                <a:cs typeface="+mn-cs"/>
-              </a:defRPr>
-            </a:lvl1pPr>
-            <a:lvl2pPr marL="685800" indent="-228600" algn="l" defTabSz="914400" rtl="0" eaLnBrk="1" latinLnBrk="1" hangingPunct="1">
-              <a:lnSpc>
-                <a:spcPct val="90000"/>
-              </a:lnSpc>
-              <a:spcBef>
-                <a:spcPts val="500"/>
-              </a:spcBef>
-              <a:buFont typeface="Arial" panose="020B0604020202020204" pitchFamily="34" charset="0"/>
-              <a:buChar char="•"/>
-              <a:defRPr sz="2400" kern="1200">
-                <a:solidFill>
-                  <a:schemeClr val="tx1"/>
-                </a:solidFill>
-                <a:latin typeface="+mn-lt"/>
-                <a:ea typeface="+mn-ea"/>
-                <a:cs typeface="+mn-cs"/>
-              </a:defRPr>
-            </a:lvl2pPr>
-            <a:lvl3pPr marL="1143000" indent="-228600" algn="l" defTabSz="914400" rtl="0" eaLnBrk="1" latinLnBrk="1" hangingPunct="1">
-              <a:lnSpc>
-                <a:spcPct val="90000"/>
-              </a:lnSpc>
-              <a:spcBef>
-                <a:spcPts val="500"/>
-              </a:spcBef>
-              <a:buFont typeface="Arial" panose="020B0604020202020204" pitchFamily="34" charset="0"/>
-              <a:buChar char="•"/>
-              <a:defRPr sz="2000" kern="1200">
-                <a:solidFill>
-                  <a:schemeClr val="tx1"/>
-                </a:solidFill>
-                <a:latin typeface="+mn-lt"/>
-                <a:ea typeface="+mn-ea"/>
-                <a:cs typeface="+mn-cs"/>
-              </a:defRPr>
-            </a:lvl3pPr>
-            <a:lvl4pPr marL="1600200" indent="-228600" algn="l" defTabSz="914400" rtl="0" eaLnBrk="1" latinLnBrk="1" hangingPunct="1">
-              <a:lnSpc>
-                <a:spcPct val="90000"/>
-              </a:lnSpc>
-              <a:spcBef>
-                <a:spcPts val="500"/>
-              </a:spcBef>
-              <a:buFont typeface="Arial" panose="020B0604020202020204" pitchFamily="34" charset="0"/>
-              <a:buChar char="•"/>
-              <a:defRPr sz="1800" kern="1200">
-                <a:solidFill>
-                  <a:schemeClr val="tx1"/>
-                </a:solidFill>
-                <a:latin typeface="+mn-lt"/>
-                <a:ea typeface="+mn-ea"/>
-                <a:cs typeface="+mn-cs"/>
-              </a:defRPr>
-            </a:lvl4pPr>
-            <a:lvl5pPr marL="2057400" indent="-228600" algn="l" defTabSz="914400" rtl="0" eaLnBrk="1" latinLnBrk="1" hangingPunct="1">
-              <a:lnSpc>
-                <a:spcPct val="90000"/>
-              </a:lnSpc>
-              <a:spcBef>
-                <a:spcPts val="500"/>
-              </a:spcBef>
-              <a:buFont typeface="Arial" panose="020B0604020202020204" pitchFamily="34" charset="0"/>
-              <a:buChar char="•"/>
-              <a:defRPr sz="1800" kern="1200">
-                <a:solidFill>
-                  <a:schemeClr val="tx1"/>
-                </a:solidFill>
-                <a:latin typeface="+mn-lt"/>
-                <a:ea typeface="+mn-ea"/>
-                <a:cs typeface="+mn-cs"/>
-              </a:defRPr>
-            </a:lvl5pPr>
-            <a:lvl6pPr marL="2514600" indent="-228600" algn="l" defTabSz="914400" rtl="0" eaLnBrk="1" latinLnBrk="1" hangingPunct="1">
-              <a:lnSpc>
-                <a:spcPct val="90000"/>
-              </a:lnSpc>
-              <a:spcBef>
-                <a:spcPts val="500"/>
-              </a:spcBef>
-              <a:buFont typeface="Arial" panose="020B0604020202020204" pitchFamily="34" charset="0"/>
-              <a:buChar char="•"/>
-              <a:defRPr sz="1800" kern="1200">
-                <a:solidFill>
-                  <a:schemeClr val="tx1"/>
-                </a:solidFill>
-                <a:latin typeface="+mn-lt"/>
-                <a:ea typeface="+mn-ea"/>
-                <a:cs typeface="+mn-cs"/>
-              </a:defRPr>
-            </a:lvl6pPr>
-            <a:lvl7pPr marL="2971800" indent="-228600" algn="l" defTabSz="914400" rtl="0" eaLnBrk="1" latinLnBrk="1" hangingPunct="1">
-              <a:lnSpc>
-                <a:spcPct val="90000"/>
-              </a:lnSpc>
-              <a:spcBef>
-                <a:spcPts val="500"/>
-              </a:spcBef>
-              <a:buFont typeface="Arial" panose="020B0604020202020204" pitchFamily="34" charset="0"/>
-              <a:buChar char="•"/>
-              <a:defRPr sz="1800" kern="1200">
-                <a:solidFill>
-                  <a:schemeClr val="tx1"/>
-                </a:solidFill>
-                <a:latin typeface="+mn-lt"/>
-                <a:ea typeface="+mn-ea"/>
-                <a:cs typeface="+mn-cs"/>
-              </a:defRPr>
-            </a:lvl7pPr>
-            <a:lvl8pPr marL="3429000" indent="-228600" algn="l" defTabSz="914400" rtl="0" eaLnBrk="1" latinLnBrk="1" hangingPunct="1">
-              <a:lnSpc>
-                <a:spcPct val="90000"/>
-              </a:lnSpc>
-              <a:spcBef>
-                <a:spcPts val="500"/>
-              </a:spcBef>
-              <a:buFont typeface="Arial" panose="020B0604020202020204" pitchFamily="34" charset="0"/>
-              <a:buChar char="•"/>
-              <a:defRPr sz="1800" kern="1200">
-                <a:solidFill>
-                  <a:schemeClr val="tx1"/>
-                </a:solidFill>
-                <a:latin typeface="+mn-lt"/>
-                <a:ea typeface="+mn-ea"/>
-                <a:cs typeface="+mn-cs"/>
-              </a:defRPr>
-            </a:lvl8pPr>
-            <a:lvl9pPr marL="3886200" indent="-228600" algn="l" defTabSz="914400" rtl="0" eaLnBrk="1" latinLnBrk="1" hangingPunct="1">
-              <a:lnSpc>
-                <a:spcPct val="90000"/>
-              </a:lnSpc>
-              <a:spcBef>
-                <a:spcPts val="500"/>
-              </a:spcBef>
-              <a:buFont typeface="Arial" panose="020B0604020202020204" pitchFamily="34" charset="0"/>
-              <a:buChar char="•"/>
-              <a:defRPr sz="1800" kern="1200">
-                <a:solidFill>
-                  <a:schemeClr val="tx1"/>
-                </a:solidFill>
-                <a:latin typeface="+mn-lt"/>
-                <a:ea typeface="+mn-ea"/>
-                <a:cs typeface="+mn-cs"/>
-              </a:defRPr>
-            </a:lvl9pPr>
-          </a:lstStyle>
-          <a:p>
-            <a:pPr lvl="1">
-              <a:lnSpc>
-                <a:spcPct val="100000"/>
-              </a:lnSpc>
-            </a:pPr>
-            <a:r>
-              <a:rPr lang="ko-KR" altLang="en-US" dirty="0"/>
-              <a:t>불완전한 회로 연결</a:t>
-            </a:r>
-            <a:r>
-              <a:rPr lang="en-US" altLang="ko-KR" dirty="0"/>
-              <a:t>, </a:t>
-            </a:r>
-            <a:r>
-              <a:rPr lang="ko-KR" altLang="en-US" dirty="0"/>
-              <a:t>주변의 자기장 등 영향으로 불규칙한 신호</a:t>
-            </a:r>
-            <a:r>
-              <a:rPr lang="en-US" altLang="ko-KR" dirty="0"/>
-              <a:t>(</a:t>
-            </a:r>
-            <a:r>
-              <a:rPr lang="ko-KR" altLang="en-US" dirty="0" err="1"/>
-              <a:t>노이즈</a:t>
-            </a:r>
-            <a:r>
-              <a:rPr lang="en-US" altLang="ko-KR" dirty="0"/>
-              <a:t>) </a:t>
-            </a:r>
-            <a:r>
-              <a:rPr lang="ko-KR" altLang="en-US" dirty="0"/>
-              <a:t>발생</a:t>
-            </a:r>
-          </a:p>
-          <a:p>
-            <a:pPr lvl="1"/>
-            <a:endParaRPr lang="en-US" altLang="ko-KR" dirty="0"/>
-          </a:p>
-        </p:txBody>
-      </p:sp>
-      <p:sp>
-        <p:nvSpPr>
-          <p:cNvPr id="9" name="제목 1"/>
-          <p:cNvSpPr txBox="1">
-            <a:spLocks/>
-          </p:cNvSpPr>
-          <p:nvPr/>
-        </p:nvSpPr>
-        <p:spPr>
-          <a:xfrm>
-            <a:off x="628650" y="365127"/>
-            <a:ext cx="8237444" cy="898898"/>
-          </a:xfrm>
-          <a:prstGeom prst="rect">
-            <a:avLst/>
-          </a:prstGeom>
-        </p:spPr>
-        <p:txBody>
-          <a:bodyPr>
-            <a:normAutofit/>
-          </a:bodyPr>
-          <a:lstStyle>
-            <a:lvl1pPr algn="l" defTabSz="914400" rtl="0" eaLnBrk="1" latinLnBrk="1" hangingPunct="1">
-              <a:lnSpc>
-                <a:spcPct val="90000"/>
-              </a:lnSpc>
-              <a:spcBef>
-                <a:spcPct val="0"/>
-              </a:spcBef>
-              <a:buNone/>
-              <a:defRPr sz="4400" kern="1200">
-                <a:solidFill>
-                  <a:schemeClr val="tx1"/>
-                </a:solidFill>
-                <a:latin typeface="+mj-lt"/>
-                <a:ea typeface="+mj-ea"/>
-                <a:cs typeface="+mj-cs"/>
-              </a:defRPr>
-            </a:lvl1pPr>
-          </a:lstStyle>
-          <a:p>
-            <a:r>
-              <a:rPr lang="ko-KR" altLang="en-US" dirty="0" err="1"/>
-              <a:t>풀로팅</a:t>
-            </a:r>
-            <a:r>
-              <a:rPr lang="en-US" altLang="ko-KR" dirty="0"/>
-              <a:t>(floating) </a:t>
-            </a:r>
-            <a:r>
-              <a:rPr lang="ko-KR" altLang="en-US" dirty="0"/>
-              <a:t>현상</a:t>
-            </a:r>
-          </a:p>
-        </p:txBody>
-      </p:sp>
-      <p:pic>
-        <p:nvPicPr>
-          <p:cNvPr id="3" name="그림 2"/>
-          <p:cNvPicPr>
-            <a:picLocks noChangeAspect="1"/>
-          </p:cNvPicPr>
-          <p:nvPr/>
-        </p:nvPicPr>
-        <p:blipFill>
-          <a:blip r:embed="rId2">
-            <a:extLst>
-              <a:ext uri="{28A0092B-C50C-407E-A947-70E740481C1C}">
-                <a14:useLocalDpi xmlns:a14="http://schemas.microsoft.com/office/drawing/2010/main" val="0"/>
-              </a:ext>
-            </a:extLst>
-          </a:blip>
-          <a:stretch>
-            <a:fillRect/>
-          </a:stretch>
-        </p:blipFill>
-        <p:spPr>
-          <a:xfrm>
-            <a:off x="1131779" y="2553613"/>
-            <a:ext cx="6667500" cy="2990850"/>
-          </a:xfrm>
-          <a:prstGeom prst="rect">
-            <a:avLst/>
-          </a:prstGeom>
-        </p:spPr>
-      </p:pic>
-    </p:spTree>
-    <p:extLst>
-      <p:ext uri="{BB962C8B-B14F-4D97-AF65-F5344CB8AC3E}">
-        <p14:creationId xmlns:p14="http://schemas.microsoft.com/office/powerpoint/2010/main" val="1956551744"/>
-      </p:ext>
-    </p:extLst>
-  </p:cSld>
-  <p:clrMapOvr>
-    <a:masterClrMapping/>
-  </p:clrMapOvr>
-</p:sld>
-</file>
-
-<file path=ppt/slides/slide11.xml><?xml version="1.0" encoding="utf-8"?>
-<p:sld xmlns:a="http://schemas.openxmlformats.org/drawingml/2006/main" xmlns:r="http://schemas.openxmlformats.org/officeDocument/2006/relationships" xmlns:p="http://schemas.openxmlformats.org/presentationml/2006/main">
-  <p:cSld>
-    <p:spTree>
-      <p:nvGrpSpPr>
-        <p:cNvPr id="1" name=""/>
-        <p:cNvGrpSpPr/>
-        <p:nvPr/>
-      </p:nvGrpSpPr>
-      <p:grpSpPr>
-        <a:xfrm>
-          <a:off x="0" y="0"/>
-          <a:ext cx="0" cy="0"/>
-          <a:chOff x="0" y="0"/>
-          <a:chExt cx="0" cy="0"/>
-        </a:xfrm>
-      </p:grpSpPr>
-      <p:sp>
-        <p:nvSpPr>
-          <p:cNvPr id="8" name="내용 개체 틀 2"/>
-          <p:cNvSpPr txBox="1">
-            <a:spLocks/>
-          </p:cNvSpPr>
-          <p:nvPr/>
-        </p:nvSpPr>
-        <p:spPr>
-          <a:xfrm>
             <a:off x="121177" y="710989"/>
             <a:ext cx="8239125" cy="1318121"/>
           </a:xfrm>
@@ -4030,74 +3690,82 @@
           <a:p>
             <a:pPr lvl="1"/>
             <a:r>
-              <a:rPr lang="en-US" altLang="ko-KR" dirty="0" err="1" smtClean="0"/>
+              <a:rPr lang="ko-KR" altLang="en-US" dirty="0"/>
+              <a:t>디지털 입력</a:t>
+            </a:r>
+            <a:r>
+              <a:rPr lang="en-US" altLang="ko-KR" dirty="0"/>
+              <a:t>(</a:t>
+            </a:r>
+            <a:r>
+              <a:rPr lang="en-US" altLang="ko-KR" dirty="0" err="1"/>
               <a:t>digitalRead</a:t>
             </a:r>
             <a:r>
-              <a:rPr lang="en-US" altLang="ko-KR" dirty="0" smtClean="0"/>
+              <a:rPr lang="en-US" altLang="ko-KR" dirty="0"/>
+              <a:t>) </a:t>
+            </a:r>
+            <a:r>
+              <a:rPr lang="ko-KR" altLang="en-US" dirty="0"/>
+              <a:t>값은</a:t>
+            </a:r>
+            <a:r>
+              <a:rPr lang="en-US" altLang="ko-KR" dirty="0"/>
+              <a:t>? HIGH or LOW</a:t>
+            </a:r>
+          </a:p>
+          <a:p>
+            <a:pPr lvl="2"/>
+            <a:r>
+              <a:rPr lang="ko-KR" altLang="en-US" dirty="0"/>
+              <a:t>스위치 </a:t>
+            </a:r>
+            <a:r>
+              <a:rPr lang="en-US" altLang="ko-KR" dirty="0"/>
+              <a:t>OFF  </a:t>
+            </a:r>
+            <a:r>
+              <a:rPr lang="ko-KR" altLang="en-US" dirty="0" err="1"/>
+              <a:t>일때</a:t>
+            </a:r>
+            <a:r>
+              <a:rPr lang="ko-KR" altLang="en-US" dirty="0"/>
+              <a:t> 불규칙한 값</a:t>
+            </a:r>
+            <a:r>
+              <a:rPr lang="en-US" altLang="ko-KR" dirty="0"/>
+              <a:t>(HIGH, LOW) </a:t>
+            </a:r>
+            <a:r>
+              <a:rPr lang="ko-KR" altLang="en-US" dirty="0"/>
+              <a:t>읽음</a:t>
+            </a:r>
+            <a:endParaRPr lang="en-US" altLang="ko-KR" dirty="0"/>
+          </a:p>
+          <a:p>
+            <a:pPr lvl="2"/>
+            <a:r>
+              <a:rPr lang="ko-KR" altLang="en-US" dirty="0"/>
+              <a:t>스위치 </a:t>
+            </a:r>
+            <a:r>
+              <a:rPr lang="en-US" altLang="ko-KR" dirty="0"/>
+              <a:t>ON </a:t>
+            </a:r>
+            <a:r>
+              <a:rPr lang="ko-KR" altLang="en-US" dirty="0" err="1"/>
+              <a:t>일때</a:t>
+            </a:r>
+            <a:r>
+              <a:rPr lang="ko-KR" altLang="en-US" dirty="0"/>
               <a:t> </a:t>
             </a:r>
             <a:r>
-              <a:rPr lang="ko-KR" altLang="en-US" dirty="0" smtClean="0"/>
-              <a:t>값은</a:t>
-            </a:r>
-            <a:r>
-              <a:rPr lang="en-US" altLang="ko-KR" dirty="0" smtClean="0"/>
-              <a:t>? HIGH or LOW</a:t>
-            </a:r>
-          </a:p>
-          <a:p>
-            <a:pPr lvl="2"/>
-            <a:r>
-              <a:rPr lang="ko-KR" altLang="en-US" dirty="0" smtClean="0"/>
-              <a:t>스위치 </a:t>
-            </a:r>
-            <a:r>
-              <a:rPr lang="en-US" altLang="ko-KR" dirty="0" smtClean="0"/>
-              <a:t>OFF  </a:t>
-            </a:r>
-            <a:r>
-              <a:rPr lang="ko-KR" altLang="en-US" dirty="0" err="1" smtClean="0"/>
-              <a:t>일때</a:t>
-            </a:r>
-            <a:r>
-              <a:rPr lang="ko-KR" altLang="en-US" dirty="0" smtClean="0"/>
-              <a:t> 불규칙한 값</a:t>
-            </a:r>
-            <a:r>
-              <a:rPr lang="en-US" altLang="ko-KR" dirty="0" smtClean="0"/>
-              <a:t>(HIGH, LOW) </a:t>
-            </a:r>
-            <a:r>
-              <a:rPr lang="ko-KR" altLang="en-US" dirty="0" smtClean="0"/>
-              <a:t>읽음</a:t>
-            </a:r>
-            <a:endParaRPr lang="en-US" altLang="ko-KR" dirty="0" smtClean="0"/>
-          </a:p>
-          <a:p>
-            <a:pPr lvl="2"/>
-            <a:r>
-              <a:rPr lang="ko-KR" altLang="en-US" dirty="0" smtClean="0"/>
-              <a:t>스위치 </a:t>
-            </a:r>
-            <a:r>
-              <a:rPr lang="en-US" altLang="ko-KR" dirty="0" smtClean="0"/>
-              <a:t>ON </a:t>
-            </a:r>
-            <a:r>
-              <a:rPr lang="ko-KR" altLang="en-US" dirty="0" err="1" smtClean="0"/>
-              <a:t>일때</a:t>
-            </a:r>
-            <a:r>
-              <a:rPr lang="ko-KR" altLang="en-US" dirty="0" smtClean="0"/>
-              <a:t> </a:t>
-            </a:r>
-            <a:r>
-              <a:rPr lang="en-US" altLang="ko-KR" dirty="0" smtClean="0"/>
+              <a:rPr lang="en-US" altLang="ko-KR" dirty="0"/>
               <a:t>HIGH(+5V) </a:t>
             </a:r>
             <a:r>
-              <a:rPr lang="ko-KR" altLang="en-US" dirty="0" smtClean="0"/>
+              <a:rPr lang="ko-KR" altLang="en-US" dirty="0"/>
               <a:t>읽음</a:t>
             </a:r>
             <a:endParaRPr lang="en-US" altLang="ko-KR" dirty="0"/>
@@ -4147,7 +3815,7 @@
 </p:sld>
 </file>
 
-<file path=ppt/slides/slide12.xml><?xml version="1.0" encoding="utf-8"?>
+<file path=ppt/slides/slide11.xml><?xml version="1.0" encoding="utf-8"?>
 <p:sld xmlns:a="http://schemas.openxmlformats.org/drawingml/2006/main" xmlns:r="http://schemas.openxmlformats.org/officeDocument/2006/relationships" xmlns:p="http://schemas.openxmlformats.org/presentationml/2006/main">
   <p:cSld>
     <p:spTree>
@@ -4169,7 +3837,7 @@
           <p:cNvPr id="10" name="그림 9" descr="전자기기이(가) 표시된 사진&#10;&#10;자동 생성된 설명">
             <a:extLst>
               <a:ext uri="{FF2B5EF4-FFF2-40B4-BE49-F238E27FC236}">
-                <a16:creationId xmlns:a16="http://schemas.microsoft.com/office/drawing/2014/main" xmlns="" id="{7BAC300E-91AB-9D44-8DBE-1216A53512CE}"/>
+                <a16:creationId xmlns:a16="http://schemas.microsoft.com/office/drawing/2014/main" id="{7BAC300E-91AB-9D44-8DBE-1216A53512CE}"/>
               </a:ext>
             </a:extLst>
           </p:cNvPr>
@@ -4204,7 +3872,7 @@
           <p:cNvPr id="11" name="TextBox 10">
             <a:extLst>
               <a:ext uri="{FF2B5EF4-FFF2-40B4-BE49-F238E27FC236}">
-                <a16:creationId xmlns:a16="http://schemas.microsoft.com/office/drawing/2014/main" xmlns="" id="{57A5A19C-5FB8-824C-AC41-DBE7A5E58E80}"/>
+                <a16:creationId xmlns:a16="http://schemas.microsoft.com/office/drawing/2014/main" id="{57A5A19C-5FB8-824C-AC41-DBE7A5E58E80}"/>
               </a:ext>
             </a:extLst>
           </p:cNvPr>
@@ -4358,7 +4026,7 @@
           <p:cNvPr id="12" name="TextBox 11">
             <a:extLst>
               <a:ext uri="{FF2B5EF4-FFF2-40B4-BE49-F238E27FC236}">
-                <a16:creationId xmlns:a16="http://schemas.microsoft.com/office/drawing/2014/main" xmlns="" id="{F1EAA06D-51A7-2047-A052-5E1468DC686B}"/>
+                <a16:creationId xmlns:a16="http://schemas.microsoft.com/office/drawing/2014/main" id="{F1EAA06D-51A7-2047-A052-5E1468DC686B}"/>
               </a:ext>
             </a:extLst>
           </p:cNvPr>
@@ -4501,14 +4169,10 @@
           <a:p>
             <a:r>
               <a:rPr lang="ko-KR" altLang="en-US" dirty="0"/>
-              <a:t>* 만약 </a:t>
-            </a:r>
-            <a:r>
-              <a:rPr lang="ko-KR" altLang="en-US" dirty="0" smtClean="0"/>
-              <a:t>스위치가 </a:t>
-            </a:r>
-            <a:r>
-              <a:rPr lang="en-US" altLang="ko-KR" dirty="0" smtClean="0"/>
+              <a:t>* 만약 스위치가 </a:t>
+            </a:r>
+            <a:r>
+              <a:rPr lang="en-US" altLang="ko-KR" dirty="0"/>
               <a:t>5V</a:t>
             </a:r>
             <a:r>
@@ -4539,7 +4203,7 @@
 </p:sld>
 </file>
 
-<file path=ppt/slides/slide13.xml><?xml version="1.0" encoding="utf-8"?>
+<file path=ppt/slides/slide12.xml><?xml version="1.0" encoding="utf-8"?>
 <p:sld xmlns:a="http://schemas.openxmlformats.org/drawingml/2006/main" xmlns:r="http://schemas.openxmlformats.org/officeDocument/2006/relationships" xmlns:p="http://schemas.openxmlformats.org/presentationml/2006/main">
   <p:cSld>
     <p:spTree>
@@ -4742,31 +4406,31 @@
           <a:p>
             <a:pPr lvl="1"/>
             <a:r>
-              <a:rPr lang="ko-KR" altLang="en-US" dirty="0" smtClean="0"/>
+              <a:rPr lang="ko-KR" altLang="en-US" dirty="0"/>
               <a:t>스위치 </a:t>
             </a:r>
             <a:r>
-              <a:rPr lang="en-US" altLang="ko-KR" dirty="0" smtClean="0"/>
+              <a:rPr lang="en-US" altLang="ko-KR" dirty="0"/>
               <a:t>ON </a:t>
             </a:r>
             <a:r>
-              <a:rPr lang="ko-KR" altLang="en-US" dirty="0" err="1" smtClean="0"/>
+              <a:rPr lang="ko-KR" altLang="en-US" dirty="0" err="1"/>
               <a:t>일때</a:t>
             </a:r>
             <a:r>
-              <a:rPr lang="ko-KR" altLang="en-US" dirty="0" smtClean="0"/>
+              <a:rPr lang="ko-KR" altLang="en-US" dirty="0"/>
               <a:t> </a:t>
             </a:r>
             <a:r>
-              <a:rPr lang="ko-KR" altLang="en-US" dirty="0" err="1" smtClean="0"/>
+              <a:rPr lang="ko-KR" altLang="en-US" dirty="0" err="1"/>
               <a:t>숏트</a:t>
             </a:r>
             <a:r>
-              <a:rPr lang="ko-KR" altLang="en-US" dirty="0" smtClean="0"/>
+              <a:rPr lang="ko-KR" altLang="en-US" dirty="0"/>
               <a:t> 발생</a:t>
             </a:r>
             <a:r>
-              <a:rPr lang="en-US" altLang="ko-KR" dirty="0" smtClean="0">
+              <a:rPr lang="en-US" altLang="ko-KR" dirty="0">
                 <a:solidFill>
                   <a:srgbClr val="FF0000"/>
                 </a:solidFill>
@@ -4774,7 +4438,7 @@
               <a:t>(</a:t>
             </a:r>
             <a:r>
-              <a:rPr lang="ko-KR" altLang="en-US" dirty="0" smtClean="0">
+              <a:rPr lang="ko-KR" altLang="en-US" dirty="0">
                 <a:solidFill>
                   <a:srgbClr val="FF0000"/>
                 </a:solidFill>
@@ -4782,7 +4446,7 @@
               <a:t>주의</a:t>
             </a:r>
             <a:r>
-              <a:rPr lang="en-US" altLang="ko-KR" dirty="0" smtClean="0">
+              <a:rPr lang="en-US" altLang="ko-KR" dirty="0">
                 <a:solidFill>
                   <a:srgbClr val="FF0000"/>
                 </a:solidFill>
@@ -4790,7 +4454,7 @@
               <a:t>!!!, </a:t>
             </a:r>
             <a:r>
-              <a:rPr lang="ko-KR" altLang="en-US" dirty="0" smtClean="0">
+              <a:rPr lang="ko-KR" altLang="en-US" dirty="0">
                 <a:solidFill>
                   <a:srgbClr val="FF0000"/>
                 </a:solidFill>
@@ -4798,7 +4462,7 @@
               <a:t>절대 연결하면 안됨</a:t>
             </a:r>
             <a:r>
-              <a:rPr lang="en-US" altLang="ko-KR" dirty="0" smtClean="0">
+              <a:rPr lang="en-US" altLang="ko-KR" dirty="0">
                 <a:solidFill>
                   <a:srgbClr val="FF0000"/>
                 </a:solidFill>
@@ -4809,31 +4473,31 @@
           <a:p>
             <a:pPr lvl="2"/>
             <a:r>
-              <a:rPr lang="ko-KR" altLang="en-US" dirty="0" smtClean="0"/>
+              <a:rPr lang="ko-KR" altLang="en-US" dirty="0"/>
               <a:t>쇼트 방지를 위해 저항</a:t>
             </a:r>
             <a:r>
-              <a:rPr lang="en-US" altLang="ko-KR" dirty="0" smtClean="0"/>
+              <a:rPr lang="en-US" altLang="ko-KR" dirty="0"/>
               <a:t>(</a:t>
             </a:r>
             <a:r>
-              <a:rPr lang="ko-KR" altLang="en-US" dirty="0" smtClean="0"/>
+              <a:rPr lang="ko-KR" altLang="en-US" dirty="0"/>
               <a:t>풀다운</a:t>
             </a:r>
             <a:r>
-              <a:rPr lang="en-US" altLang="ko-KR" dirty="0" smtClean="0"/>
+              <a:rPr lang="en-US" altLang="ko-KR" dirty="0"/>
               <a:t>, </a:t>
             </a:r>
             <a:r>
-              <a:rPr lang="ko-KR" altLang="en-US" dirty="0" err="1" smtClean="0"/>
+              <a:rPr lang="ko-KR" altLang="en-US" dirty="0" err="1"/>
               <a:t>풀업</a:t>
             </a:r>
             <a:r>
-              <a:rPr lang="en-US" altLang="ko-KR" dirty="0" smtClean="0"/>
+              <a:rPr lang="en-US" altLang="ko-KR" dirty="0"/>
               <a:t>, INPUT_PULL_UP)</a:t>
             </a:r>
             <a:r>
-              <a:rPr lang="ko-KR" altLang="en-US" dirty="0" smtClean="0"/>
+              <a:rPr lang="ko-KR" altLang="en-US" dirty="0"/>
               <a:t>이 필요</a:t>
             </a:r>
             <a:endParaRPr lang="en-US" altLang="ko-KR" dirty="0"/>
@@ -4913,7 +4577,7 @@
 </p:sld>
 </file>
 
-<file path=ppt/slides/slide14.xml><?xml version="1.0" encoding="utf-8"?>
+<file path=ppt/slides/slide13.xml><?xml version="1.0" encoding="utf-8"?>
 <p:sld xmlns:a="http://schemas.openxmlformats.org/drawingml/2006/main" xmlns:r="http://schemas.openxmlformats.org/officeDocument/2006/relationships" xmlns:p="http://schemas.openxmlformats.org/presentationml/2006/main">
   <p:cSld>
     <p:spTree>
@@ -5345,7 +5009,7 @@
 </p:sld>
 </file>
 
-<file path=ppt/slides/slide15.xml><?xml version="1.0" encoding="utf-8"?>
+<file path=ppt/slides/slide14.xml><?xml version="1.0" encoding="utf-8"?>
 <p:sld xmlns:a="http://schemas.openxmlformats.org/drawingml/2006/main" xmlns:r="http://schemas.openxmlformats.org/officeDocument/2006/relationships" xmlns:p="http://schemas.openxmlformats.org/presentationml/2006/main">
   <p:cSld>
     <p:spTree>
@@ -5389,7 +5053,7 @@
               <a:buChar char="•"/>
             </a:pPr>
             <a:r>
-              <a:rPr lang="en-US" altLang="ko-KR" sz="2800" dirty="0" smtClean="0"/>
+              <a:rPr lang="en-US" altLang="ko-KR" sz="2800" dirty="0"/>
               <a:t>Fritzing : PULL-DOWN</a:t>
             </a:r>
             <a:endParaRPr lang="ko-KR" altLang="en-US" sz="2800" dirty="0"/>
@@ -5439,7 +5103,7 @@
 </p:sld>
 </file>
 
-<file path=ppt/slides/slide16.xml><?xml version="1.0" encoding="utf-8"?>
+<file path=ppt/slides/slide15.xml><?xml version="1.0" encoding="utf-8"?>
 <p:sld xmlns:a="http://schemas.openxmlformats.org/drawingml/2006/main" xmlns:r="http://schemas.openxmlformats.org/officeDocument/2006/relationships" xmlns:p="http://schemas.openxmlformats.org/presentationml/2006/main">
   <p:cSld>
     <p:spTree>
@@ -5494,7 +5158,7 @@
           <p:cNvPr id="4" name="그림 3" descr="텍스트이(가) 표시된 사진&#10;&#10;자동 생성된 설명">
             <a:extLst>
               <a:ext uri="{FF2B5EF4-FFF2-40B4-BE49-F238E27FC236}">
-                <a16:creationId xmlns:a16="http://schemas.microsoft.com/office/drawing/2014/main" xmlns="" id="{6F192102-15FA-6C48-837A-78B031F2364F}"/>
+                <a16:creationId xmlns:a16="http://schemas.microsoft.com/office/drawing/2014/main" id="{6F192102-15FA-6C48-837A-78B031F2364F}"/>
               </a:ext>
             </a:extLst>
           </p:cNvPr>
@@ -5538,7 +5202,7 @@
 </p:sld>
 </file>
 
-<file path=ppt/slides/slide17.xml><?xml version="1.0" encoding="utf-8"?>
+<file path=ppt/slides/slide16.xml><?xml version="1.0" encoding="utf-8"?>
 <p:sld xmlns:a="http://schemas.openxmlformats.org/drawingml/2006/main" xmlns:r="http://schemas.openxmlformats.org/officeDocument/2006/relationships" xmlns:p="http://schemas.openxmlformats.org/presentationml/2006/main">
   <p:cSld>
     <p:spTree>
@@ -5981,6 +5645,106 @@
 </p:sld>
 </file>
 
+<file path=ppt/slides/slide17.xml><?xml version="1.0" encoding="utf-8"?>
+<p:sld xmlns:a="http://schemas.openxmlformats.org/drawingml/2006/main" xmlns:r="http://schemas.openxmlformats.org/officeDocument/2006/relationships" xmlns:p="http://schemas.openxmlformats.org/presentationml/2006/main">
+  <p:cSld>
+    <p:spTree>
+      <p:nvGrpSpPr>
+        <p:cNvPr id="1" name=""/>
+        <p:cNvGrpSpPr/>
+        <p:nvPr/>
+      </p:nvGrpSpPr>
+      <p:grpSpPr>
+        <a:xfrm>
+          <a:off x="0" y="0"/>
+          <a:ext cx="0" cy="0"/>
+          <a:chOff x="0" y="0"/>
+          <a:chExt cx="0" cy="0"/>
+        </a:xfrm>
+      </p:grpSpPr>
+      <p:sp>
+        <p:nvSpPr>
+          <p:cNvPr id="2" name="제목 1"/>
+          <p:cNvSpPr>
+            <a:spLocks noGrp="1"/>
+          </p:cNvSpPr>
+          <p:nvPr>
+            <p:ph type="title"/>
+          </p:nvPr>
+        </p:nvSpPr>
+        <p:spPr>
+          <a:xfrm>
+            <a:off x="617633" y="122756"/>
+            <a:ext cx="8237444" cy="898898"/>
+          </a:xfrm>
+        </p:spPr>
+        <p:txBody>
+          <a:bodyPr>
+            <a:normAutofit/>
+          </a:bodyPr>
+          <a:lstStyle/>
+          <a:p>
+            <a:pPr marL="457200" indent="-457200">
+              <a:buFont typeface="Arial" panose="020B0604020202020204" pitchFamily="34" charset="0"/>
+              <a:buChar char="•"/>
+            </a:pPr>
+            <a:r>
+              <a:rPr lang="en-US" altLang="ko-KR" sz="2800" dirty="0"/>
+              <a:t>Fritzing : PULL-UP</a:t>
+            </a:r>
+            <a:endParaRPr lang="ko-KR" altLang="en-US" sz="2800" dirty="0"/>
+          </a:p>
+        </p:txBody>
+      </p:sp>
+      <p:pic>
+        <p:nvPicPr>
+          <p:cNvPr id="5" name="그림 4" descr="전자기기, 회로이(가) 표시된 사진&#10;&#10;자동 생성된 설명">
+            <a:extLst>
+              <a:ext uri="{FF2B5EF4-FFF2-40B4-BE49-F238E27FC236}">
+                <a16:creationId xmlns:a16="http://schemas.microsoft.com/office/drawing/2014/main" id="{54DF8E6A-3FE1-FF4E-8B7B-F1B01B11D8D7}"/>
+              </a:ext>
+            </a:extLst>
+          </p:cNvPr>
+          <p:cNvPicPr>
+            <a:picLocks noChangeAspect="1"/>
+          </p:cNvPicPr>
+          <p:nvPr/>
+        </p:nvPicPr>
+        <p:blipFill>
+          <a:blip r:embed="rId2">
+            <a:extLst>
+              <a:ext uri="{28A0092B-C50C-407E-A947-70E740481C1C}">
+                <a14:useLocalDpi xmlns:a14="http://schemas.microsoft.com/office/drawing/2010/main" val="0"/>
+              </a:ext>
+            </a:extLst>
+          </a:blip>
+          <a:stretch>
+            <a:fillRect/>
+          </a:stretch>
+        </p:blipFill>
+        <p:spPr>
+          <a:xfrm>
+            <a:off x="440808" y="1505526"/>
+            <a:ext cx="8262383" cy="4382655"/>
+          </a:xfrm>
+          <a:prstGeom prst="rect">
+            <a:avLst/>
+          </a:prstGeom>
+        </p:spPr>
+      </p:pic>
+    </p:spTree>
+    <p:extLst>
+      <p:ext uri="{BB962C8B-B14F-4D97-AF65-F5344CB8AC3E}">
+        <p14:creationId xmlns:p14="http://schemas.microsoft.com/office/powerpoint/2010/main" val="4067768396"/>
+      </p:ext>
+    </p:extLst>
+  </p:cSld>
+  <p:clrMapOvr>
+    <a:masterClrMapping/>
+  </p:clrMapOvr>
+</p:sld>
+</file>
+
 <file path=ppt/slides/slide18.xml><?xml version="1.0" encoding="utf-8"?>
 <p:sld xmlns:a="http://schemas.openxmlformats.org/drawingml/2006/main" xmlns:r="http://schemas.openxmlformats.org/officeDocument/2006/relationships" xmlns:p="http://schemas.openxmlformats.org/presentationml/2006/main">
   <p:cSld>
@@ -6036,7 +5800,7 @@
           <p:cNvPr id="13" name="그림 12" descr="스크린샷, 텍스트이(가) 표시된 사진&#10;&#10;자동 생성된 설명">
             <a:extLst>
               <a:ext uri="{FF2B5EF4-FFF2-40B4-BE49-F238E27FC236}">
-                <a16:creationId xmlns:a16="http://schemas.microsoft.com/office/drawing/2014/main" xmlns="" id="{C483F129-A159-EA4C-A6D5-616F2EB5398E}"/>
+                <a16:creationId xmlns:a16="http://schemas.microsoft.com/office/drawing/2014/main" id="{C483F129-A159-EA4C-A6D5-616F2EB5398E}"/>
               </a:ext>
             </a:extLst>
           </p:cNvPr>
@@ -6544,11 +6308,11 @@
               <a:t>(</a:t>
             </a:r>
             <a:r>
-              <a:rPr lang="en-US" altLang="ko-KR" dirty="0" err="1" smtClean="0"/>
+              <a:rPr lang="en-US" altLang="ko-KR" dirty="0" err="1"/>
               <a:t>Pull-DOWN</a:t>
             </a:r>
             <a:r>
-              <a:rPr lang="en-US" altLang="ko-KR" dirty="0" smtClean="0"/>
+              <a:rPr lang="en-US" altLang="ko-KR" dirty="0"/>
               <a:t>) </a:t>
             </a:r>
             <a:r>
@@ -6565,11 +6329,7 @@
             </a:r>
             <a:r>
               <a:rPr lang="en-US" altLang="ko-KR" dirty="0"/>
-              <a:t>(</a:t>
-            </a:r>
-            <a:r>
-              <a:rPr lang="en-US" altLang="ko-KR" dirty="0" smtClean="0"/>
-              <a:t>PULL-UP) </a:t>
+              <a:t>(PULL-UP) </a:t>
             </a:r>
             <a:r>
               <a:rPr lang="ko-KR" altLang="en-US" dirty="0"/>
@@ -6598,16 +6358,12 @@
           </a:p>
           <a:p>
             <a:r>
-              <a:rPr lang="en-US" altLang="ko-KR" dirty="0" smtClean="0"/>
+              <a:rPr lang="en-US" altLang="ko-KR" dirty="0"/>
               <a:t>INPUT_PULL_UP</a:t>
             </a:r>
             <a:r>
-              <a:rPr lang="ko-KR" altLang="en-US" dirty="0" smtClean="0"/>
-              <a:t> </a:t>
-            </a:r>
-            <a:r>
               <a:rPr lang="ko-KR" altLang="en-US" dirty="0"/>
-              <a:t>저항을 이용한 </a:t>
+              <a:t> 저항을 이용한 </a:t>
             </a:r>
             <a:r>
               <a:rPr lang="en-US" altLang="ko-KR" dirty="0"/>
@@ -7669,7 +7425,7 @@
           <p:cNvPr id="6" name="내용 개체 틀 2">
             <a:extLst>
               <a:ext uri="{FF2B5EF4-FFF2-40B4-BE49-F238E27FC236}">
-                <a16:creationId xmlns:a16="http://schemas.microsoft.com/office/drawing/2014/main" xmlns="" id="{DF087650-FC74-7247-9653-3D7CFFBCEE43}"/>
+                <a16:creationId xmlns:a16="http://schemas.microsoft.com/office/drawing/2014/main" id="{DF087650-FC74-7247-9653-3D7CFFBCEE43}"/>
               </a:ext>
             </a:extLst>
           </p:cNvPr>
@@ -7974,7 +7730,7 @@
           <p:cNvPr id="4" name="그림 3" descr="텍스트이(가) 표시된 사진&#10;&#10;자동 생성된 설명">
             <a:extLst>
               <a:ext uri="{FF2B5EF4-FFF2-40B4-BE49-F238E27FC236}">
-                <a16:creationId xmlns:a16="http://schemas.microsoft.com/office/drawing/2014/main" xmlns="" id="{29ABF8AB-78AC-044A-ABEA-D907F93D7C78}"/>
+                <a16:creationId xmlns:a16="http://schemas.microsoft.com/office/drawing/2014/main" id="{29ABF8AB-78AC-044A-ABEA-D907F93D7C78}"/>
               </a:ext>
             </a:extLst>
           </p:cNvPr>
@@ -8090,17 +7846,6 @@
               <a:rPr lang="ko-KR" altLang="en-US" sz="4400" dirty="0"/>
               <a:t>제작</a:t>
             </a:r>
-            <a:r>
-              <a:rPr lang="ko-KR" altLang="en-US" kern="1200" dirty="0">
-                <a:solidFill>
-                  <a:prstClr val="black"/>
-                </a:solidFill>
-                <a:latin typeface="Calibri" panose="020F0502020204030204"/>
-                <a:ea typeface="맑은 고딕" panose="020B0503020000020004" pitchFamily="34" charset="-127"/>
-                <a:cs typeface="+mn-cs"/>
-              </a:rPr>
-              <a:t/>
-            </a:r>
             <a:br>
               <a:rPr lang="ko-KR" altLang="en-US" kern="1200" dirty="0">
                 <a:solidFill>
@@ -8120,7 +7865,7 @@
           <p:cNvPr id="5" name="내용 개체 틀 2">
             <a:extLst>
               <a:ext uri="{FF2B5EF4-FFF2-40B4-BE49-F238E27FC236}">
-                <a16:creationId xmlns:a16="http://schemas.microsoft.com/office/drawing/2014/main" xmlns="" id="{EF178005-F9F5-DB41-9651-29FA5F1A2373}"/>
+                <a16:creationId xmlns:a16="http://schemas.microsoft.com/office/drawing/2014/main" id="{EF178005-F9F5-DB41-9651-29FA5F1A2373}"/>
               </a:ext>
             </a:extLst>
           </p:cNvPr>
@@ -9807,7 +9552,7 @@
         </p:nvSpPr>
         <p:spPr>
           <a:xfrm>
-            <a:off x="628649" y="1374016"/>
+            <a:off x="628649" y="1296240"/>
             <a:ext cx="8084697" cy="1027022"/>
           </a:xfrm>
           <a:prstGeom prst="rect">
@@ -10041,7 +9786,7 @@
         </p:blipFill>
         <p:spPr>
           <a:xfrm>
-            <a:off x="1542398" y="2707516"/>
+            <a:off x="1619516" y="2857780"/>
             <a:ext cx="5566099" cy="3047439"/>
           </a:xfrm>
           <a:prstGeom prst="rect">
@@ -10341,751 +10086,6 @@
       </p:grpSpPr>
       <p:sp>
         <p:nvSpPr>
-          <p:cNvPr id="2" name="제목 1"/>
-          <p:cNvSpPr>
-            <a:spLocks noGrp="1"/>
-          </p:cNvSpPr>
-          <p:nvPr>
-            <p:ph type="title"/>
-          </p:nvPr>
-        </p:nvSpPr>
-        <p:spPr>
-          <a:xfrm>
-            <a:off x="628650" y="365126"/>
-            <a:ext cx="7886700" cy="673099"/>
-          </a:xfrm>
-        </p:spPr>
-        <p:txBody>
-          <a:bodyPr>
-            <a:normAutofit fontScale="90000"/>
-          </a:bodyPr>
-          <a:lstStyle/>
-          <a:p>
-            <a:r>
-              <a:rPr lang="ko-KR" altLang="en-US" dirty="0"/>
-              <a:t>디지털 입력</a:t>
-            </a:r>
-          </a:p>
-        </p:txBody>
-      </p:sp>
-      <p:sp>
-        <p:nvSpPr>
-          <p:cNvPr id="4" name="내용 개체 틀 2"/>
-          <p:cNvSpPr txBox="1">
-            <a:spLocks/>
-          </p:cNvSpPr>
-          <p:nvPr/>
-        </p:nvSpPr>
-        <p:spPr>
-          <a:xfrm>
-            <a:off x="628649" y="1143001"/>
-            <a:ext cx="8239125" cy="1333500"/>
-          </a:xfrm>
-          <a:prstGeom prst="rect">
-            <a:avLst/>
-          </a:prstGeom>
-        </p:spPr>
-        <p:txBody>
-          <a:bodyPr/>
-          <a:lstStyle>
-            <a:lvl1pPr marL="228600" indent="-228600" algn="l" defTabSz="914400" rtl="0" eaLnBrk="1" latinLnBrk="1" hangingPunct="1">
-              <a:lnSpc>
-                <a:spcPct val="90000"/>
-              </a:lnSpc>
-              <a:spcBef>
-                <a:spcPts val="1000"/>
-              </a:spcBef>
-              <a:buFont typeface="Arial" panose="020B0604020202020204" pitchFamily="34" charset="0"/>
-              <a:buChar char="•"/>
-              <a:defRPr sz="2800" kern="1200">
-                <a:solidFill>
-                  <a:schemeClr val="tx1"/>
-                </a:solidFill>
-                <a:latin typeface="+mn-lt"/>
-                <a:ea typeface="+mn-ea"/>
-                <a:cs typeface="+mn-cs"/>
-              </a:defRPr>
-            </a:lvl1pPr>
-            <a:lvl2pPr marL="685800" indent="-228600" algn="l" defTabSz="914400" rtl="0" eaLnBrk="1" latinLnBrk="1" hangingPunct="1">
-              <a:lnSpc>
-                <a:spcPct val="90000"/>
-              </a:lnSpc>
-              <a:spcBef>
-                <a:spcPts val="500"/>
-              </a:spcBef>
-              <a:buFont typeface="Arial" panose="020B0604020202020204" pitchFamily="34" charset="0"/>
-              <a:buChar char="•"/>
-              <a:defRPr sz="2400" kern="1200">
-                <a:solidFill>
-                  <a:schemeClr val="tx1"/>
-                </a:solidFill>
-                <a:latin typeface="+mn-lt"/>
-                <a:ea typeface="+mn-ea"/>
-                <a:cs typeface="+mn-cs"/>
-              </a:defRPr>
-            </a:lvl2pPr>
-            <a:lvl3pPr marL="1143000" indent="-228600" algn="l" defTabSz="914400" rtl="0" eaLnBrk="1" latinLnBrk="1" hangingPunct="1">
-              <a:lnSpc>
-                <a:spcPct val="90000"/>
-              </a:lnSpc>
-              <a:spcBef>
-                <a:spcPts val="500"/>
-              </a:spcBef>
-              <a:buFont typeface="Arial" panose="020B0604020202020204" pitchFamily="34" charset="0"/>
-              <a:buChar char="•"/>
-              <a:defRPr sz="2000" kern="1200">
-                <a:solidFill>
-                  <a:schemeClr val="tx1"/>
-                </a:solidFill>
-                <a:latin typeface="+mn-lt"/>
-                <a:ea typeface="+mn-ea"/>
-                <a:cs typeface="+mn-cs"/>
-              </a:defRPr>
-            </a:lvl3pPr>
-            <a:lvl4pPr marL="1600200" indent="-228600" algn="l" defTabSz="914400" rtl="0" eaLnBrk="1" latinLnBrk="1" hangingPunct="1">
-              <a:lnSpc>
-                <a:spcPct val="90000"/>
-              </a:lnSpc>
-              <a:spcBef>
-                <a:spcPts val="500"/>
-              </a:spcBef>
-              <a:buFont typeface="Arial" panose="020B0604020202020204" pitchFamily="34" charset="0"/>
-              <a:buChar char="•"/>
-              <a:defRPr sz="1800" kern="1200">
-                <a:solidFill>
-                  <a:schemeClr val="tx1"/>
-                </a:solidFill>
-                <a:latin typeface="+mn-lt"/>
-                <a:ea typeface="+mn-ea"/>
-                <a:cs typeface="+mn-cs"/>
-              </a:defRPr>
-            </a:lvl4pPr>
-            <a:lvl5pPr marL="2057400" indent="-228600" algn="l" defTabSz="914400" rtl="0" eaLnBrk="1" latinLnBrk="1" hangingPunct="1">
-              <a:lnSpc>
-                <a:spcPct val="90000"/>
-              </a:lnSpc>
-              <a:spcBef>
-                <a:spcPts val="500"/>
-              </a:spcBef>
-              <a:buFont typeface="Arial" panose="020B0604020202020204" pitchFamily="34" charset="0"/>
-              <a:buChar char="•"/>
-              <a:defRPr sz="1800" kern="1200">
-                <a:solidFill>
-                  <a:schemeClr val="tx1"/>
-                </a:solidFill>
-                <a:latin typeface="+mn-lt"/>
-                <a:ea typeface="+mn-ea"/>
-                <a:cs typeface="+mn-cs"/>
-              </a:defRPr>
-            </a:lvl5pPr>
-            <a:lvl6pPr marL="2514600" indent="-228600" algn="l" defTabSz="914400" rtl="0" eaLnBrk="1" latinLnBrk="1" hangingPunct="1">
-              <a:lnSpc>
-                <a:spcPct val="90000"/>
-              </a:lnSpc>
-              <a:spcBef>
-                <a:spcPts val="500"/>
-              </a:spcBef>
-              <a:buFont typeface="Arial" panose="020B0604020202020204" pitchFamily="34" charset="0"/>
-              <a:buChar char="•"/>
-              <a:defRPr sz="1800" kern="1200">
-                <a:solidFill>
-                  <a:schemeClr val="tx1"/>
-                </a:solidFill>
-                <a:latin typeface="+mn-lt"/>
-                <a:ea typeface="+mn-ea"/>
-                <a:cs typeface="+mn-cs"/>
-              </a:defRPr>
-            </a:lvl6pPr>
-            <a:lvl7pPr marL="2971800" indent="-228600" algn="l" defTabSz="914400" rtl="0" eaLnBrk="1" latinLnBrk="1" hangingPunct="1">
-              <a:lnSpc>
-                <a:spcPct val="90000"/>
-              </a:lnSpc>
-              <a:spcBef>
-                <a:spcPts val="500"/>
-              </a:spcBef>
-              <a:buFont typeface="Arial" panose="020B0604020202020204" pitchFamily="34" charset="0"/>
-              <a:buChar char="•"/>
-              <a:defRPr sz="1800" kern="1200">
-                <a:solidFill>
-                  <a:schemeClr val="tx1"/>
-                </a:solidFill>
-                <a:latin typeface="+mn-lt"/>
-                <a:ea typeface="+mn-ea"/>
-                <a:cs typeface="+mn-cs"/>
-              </a:defRPr>
-            </a:lvl7pPr>
-            <a:lvl8pPr marL="3429000" indent="-228600" algn="l" defTabSz="914400" rtl="0" eaLnBrk="1" latinLnBrk="1" hangingPunct="1">
-              <a:lnSpc>
-                <a:spcPct val="90000"/>
-              </a:lnSpc>
-              <a:spcBef>
-                <a:spcPts val="500"/>
-              </a:spcBef>
-              <a:buFont typeface="Arial" panose="020B0604020202020204" pitchFamily="34" charset="0"/>
-              <a:buChar char="•"/>
-              <a:defRPr sz="1800" kern="1200">
-                <a:solidFill>
-                  <a:schemeClr val="tx1"/>
-                </a:solidFill>
-                <a:latin typeface="+mn-lt"/>
-                <a:ea typeface="+mn-ea"/>
-                <a:cs typeface="+mn-cs"/>
-              </a:defRPr>
-            </a:lvl8pPr>
-            <a:lvl9pPr marL="3886200" indent="-228600" algn="l" defTabSz="914400" rtl="0" eaLnBrk="1" latinLnBrk="1" hangingPunct="1">
-              <a:lnSpc>
-                <a:spcPct val="90000"/>
-              </a:lnSpc>
-              <a:spcBef>
-                <a:spcPts val="500"/>
-              </a:spcBef>
-              <a:buFont typeface="Arial" panose="020B0604020202020204" pitchFamily="34" charset="0"/>
-              <a:buChar char="•"/>
-              <a:defRPr sz="1800" kern="1200">
-                <a:solidFill>
-                  <a:schemeClr val="tx1"/>
-                </a:solidFill>
-                <a:latin typeface="+mn-lt"/>
-                <a:ea typeface="+mn-ea"/>
-                <a:cs typeface="+mn-cs"/>
-              </a:defRPr>
-            </a:lvl9pPr>
-          </a:lstStyle>
-          <a:p>
-            <a:endParaRPr lang="ko-KR" altLang="en-US" dirty="0"/>
-          </a:p>
-        </p:txBody>
-      </p:sp>
-      <p:sp>
-        <p:nvSpPr>
-          <p:cNvPr id="8" name="내용 개체 틀 2"/>
-          <p:cNvSpPr txBox="1">
-            <a:spLocks/>
-          </p:cNvSpPr>
-          <p:nvPr/>
-        </p:nvSpPr>
-        <p:spPr>
-          <a:xfrm>
-            <a:off x="628649" y="1374016"/>
-            <a:ext cx="8084697" cy="1027022"/>
-          </a:xfrm>
-          <a:prstGeom prst="rect">
-            <a:avLst/>
-          </a:prstGeom>
-        </p:spPr>
-        <p:txBody>
-          <a:bodyPr/>
-          <a:lstStyle>
-            <a:lvl1pPr marL="228600" indent="-228600" algn="l" defTabSz="914400" rtl="0" eaLnBrk="1" latinLnBrk="1" hangingPunct="1">
-              <a:lnSpc>
-                <a:spcPct val="90000"/>
-              </a:lnSpc>
-              <a:spcBef>
-                <a:spcPts val="1000"/>
-              </a:spcBef>
-              <a:buFont typeface="Arial" panose="020B0604020202020204" pitchFamily="34" charset="0"/>
-              <a:buChar char="•"/>
-              <a:defRPr sz="2800" kern="1200">
-                <a:solidFill>
-                  <a:schemeClr val="tx1"/>
-                </a:solidFill>
-                <a:latin typeface="+mn-lt"/>
-                <a:ea typeface="+mn-ea"/>
-                <a:cs typeface="+mn-cs"/>
-              </a:defRPr>
-            </a:lvl1pPr>
-            <a:lvl2pPr marL="685800" indent="-228600" algn="l" defTabSz="914400" rtl="0" eaLnBrk="1" latinLnBrk="1" hangingPunct="1">
-              <a:lnSpc>
-                <a:spcPct val="90000"/>
-              </a:lnSpc>
-              <a:spcBef>
-                <a:spcPts val="500"/>
-              </a:spcBef>
-              <a:buFont typeface="Arial" panose="020B0604020202020204" pitchFamily="34" charset="0"/>
-              <a:buChar char="•"/>
-              <a:defRPr sz="2400" kern="1200">
-                <a:solidFill>
-                  <a:schemeClr val="tx1"/>
-                </a:solidFill>
-                <a:latin typeface="+mn-lt"/>
-                <a:ea typeface="+mn-ea"/>
-                <a:cs typeface="+mn-cs"/>
-              </a:defRPr>
-            </a:lvl2pPr>
-            <a:lvl3pPr marL="1143000" indent="-228600" algn="l" defTabSz="914400" rtl="0" eaLnBrk="1" latinLnBrk="1" hangingPunct="1">
-              <a:lnSpc>
-                <a:spcPct val="90000"/>
-              </a:lnSpc>
-              <a:spcBef>
-                <a:spcPts val="500"/>
-              </a:spcBef>
-              <a:buFont typeface="Arial" panose="020B0604020202020204" pitchFamily="34" charset="0"/>
-              <a:buChar char="•"/>
-              <a:defRPr sz="2000" kern="1200">
-                <a:solidFill>
-                  <a:schemeClr val="tx1"/>
-                </a:solidFill>
-                <a:latin typeface="+mn-lt"/>
-                <a:ea typeface="+mn-ea"/>
-                <a:cs typeface="+mn-cs"/>
-              </a:defRPr>
-            </a:lvl3pPr>
-            <a:lvl4pPr marL="1600200" indent="-228600" algn="l" defTabSz="914400" rtl="0" eaLnBrk="1" latinLnBrk="1" hangingPunct="1">
-              <a:lnSpc>
-                <a:spcPct val="90000"/>
-              </a:lnSpc>
-              <a:spcBef>
-                <a:spcPts val="500"/>
-              </a:spcBef>
-              <a:buFont typeface="Arial" panose="020B0604020202020204" pitchFamily="34" charset="0"/>
-              <a:buChar char="•"/>
-              <a:defRPr sz="1800" kern="1200">
-                <a:solidFill>
-                  <a:schemeClr val="tx1"/>
-                </a:solidFill>
-                <a:latin typeface="+mn-lt"/>
-                <a:ea typeface="+mn-ea"/>
-                <a:cs typeface="+mn-cs"/>
-              </a:defRPr>
-            </a:lvl4pPr>
-            <a:lvl5pPr marL="2057400" indent="-228600" algn="l" defTabSz="914400" rtl="0" eaLnBrk="1" latinLnBrk="1" hangingPunct="1">
-              <a:lnSpc>
-                <a:spcPct val="90000"/>
-              </a:lnSpc>
-              <a:spcBef>
-                <a:spcPts val="500"/>
-              </a:spcBef>
-              <a:buFont typeface="Arial" panose="020B0604020202020204" pitchFamily="34" charset="0"/>
-              <a:buChar char="•"/>
-              <a:defRPr sz="1800" kern="1200">
-                <a:solidFill>
-                  <a:schemeClr val="tx1"/>
-                </a:solidFill>
-                <a:latin typeface="+mn-lt"/>
-                <a:ea typeface="+mn-ea"/>
-                <a:cs typeface="+mn-cs"/>
-              </a:defRPr>
-            </a:lvl5pPr>
-            <a:lvl6pPr marL="2514600" indent="-228600" algn="l" defTabSz="914400" rtl="0" eaLnBrk="1" latinLnBrk="1" hangingPunct="1">
-              <a:lnSpc>
-                <a:spcPct val="90000"/>
-              </a:lnSpc>
-              <a:spcBef>
-                <a:spcPts val="500"/>
-              </a:spcBef>
-              <a:buFont typeface="Arial" panose="020B0604020202020204" pitchFamily="34" charset="0"/>
-              <a:buChar char="•"/>
-              <a:defRPr sz="1800" kern="1200">
-                <a:solidFill>
-                  <a:schemeClr val="tx1"/>
-                </a:solidFill>
-                <a:latin typeface="+mn-lt"/>
-                <a:ea typeface="+mn-ea"/>
-                <a:cs typeface="+mn-cs"/>
-              </a:defRPr>
-            </a:lvl6pPr>
-            <a:lvl7pPr marL="2971800" indent="-228600" algn="l" defTabSz="914400" rtl="0" eaLnBrk="1" latinLnBrk="1" hangingPunct="1">
-              <a:lnSpc>
-                <a:spcPct val="90000"/>
-              </a:lnSpc>
-              <a:spcBef>
-                <a:spcPts val="500"/>
-              </a:spcBef>
-              <a:buFont typeface="Arial" panose="020B0604020202020204" pitchFamily="34" charset="0"/>
-              <a:buChar char="•"/>
-              <a:defRPr sz="1800" kern="1200">
-                <a:solidFill>
-                  <a:schemeClr val="tx1"/>
-                </a:solidFill>
-                <a:latin typeface="+mn-lt"/>
-                <a:ea typeface="+mn-ea"/>
-                <a:cs typeface="+mn-cs"/>
-              </a:defRPr>
-            </a:lvl7pPr>
-            <a:lvl8pPr marL="3429000" indent="-228600" algn="l" defTabSz="914400" rtl="0" eaLnBrk="1" latinLnBrk="1" hangingPunct="1">
-              <a:lnSpc>
-                <a:spcPct val="90000"/>
-              </a:lnSpc>
-              <a:spcBef>
-                <a:spcPts val="500"/>
-              </a:spcBef>
-              <a:buFont typeface="Arial" panose="020B0604020202020204" pitchFamily="34" charset="0"/>
-              <a:buChar char="•"/>
-              <a:defRPr sz="1800" kern="1200">
-                <a:solidFill>
-                  <a:schemeClr val="tx1"/>
-                </a:solidFill>
-                <a:latin typeface="+mn-lt"/>
-                <a:ea typeface="+mn-ea"/>
-                <a:cs typeface="+mn-cs"/>
-              </a:defRPr>
-            </a:lvl8pPr>
-            <a:lvl9pPr marL="3886200" indent="-228600" algn="l" defTabSz="914400" rtl="0" eaLnBrk="1" latinLnBrk="1" hangingPunct="1">
-              <a:lnSpc>
-                <a:spcPct val="90000"/>
-              </a:lnSpc>
-              <a:spcBef>
-                <a:spcPts val="500"/>
-              </a:spcBef>
-              <a:buFont typeface="Arial" panose="020B0604020202020204" pitchFamily="34" charset="0"/>
-              <a:buChar char="•"/>
-              <a:defRPr sz="1800" kern="1200">
-                <a:solidFill>
-                  <a:schemeClr val="tx1"/>
-                </a:solidFill>
-                <a:latin typeface="+mn-lt"/>
-                <a:ea typeface="+mn-ea"/>
-                <a:cs typeface="+mn-cs"/>
-              </a:defRPr>
-            </a:lvl9pPr>
-          </a:lstStyle>
-          <a:p>
-            <a:r>
-              <a:rPr lang="ko-KR" altLang="en-US" dirty="0"/>
-              <a:t>버튼을 누르지 않을 경우 </a:t>
-            </a:r>
-            <a:r>
-              <a:rPr lang="en-US" altLang="ko-KR" dirty="0"/>
-              <a:t>: 1</a:t>
-            </a:r>
-            <a:r>
-              <a:rPr lang="ko-KR" altLang="en-US" dirty="0"/>
-              <a:t>번</a:t>
-            </a:r>
-            <a:r>
-              <a:rPr lang="en-US" altLang="ko-KR" dirty="0"/>
-              <a:t>, 2</a:t>
-            </a:r>
-            <a:r>
-              <a:rPr lang="ko-KR" altLang="en-US" dirty="0"/>
-              <a:t>번 </a:t>
-            </a:r>
-            <a:r>
-              <a:rPr lang="en-US" altLang="ko-KR" dirty="0"/>
-              <a:t>/ 3</a:t>
-            </a:r>
-            <a:r>
-              <a:rPr lang="ko-KR" altLang="en-US" dirty="0"/>
-              <a:t>번</a:t>
-            </a:r>
-            <a:r>
-              <a:rPr lang="en-US" altLang="ko-KR" dirty="0"/>
-              <a:t>, 4</a:t>
-            </a:r>
-            <a:r>
-              <a:rPr lang="ko-KR" altLang="en-US" dirty="0"/>
-              <a:t>번 연결</a:t>
-            </a:r>
-            <a:endParaRPr lang="en-US" altLang="ko-KR" dirty="0"/>
-          </a:p>
-          <a:p>
-            <a:r>
-              <a:rPr lang="ko-KR" altLang="en-US" dirty="0"/>
-              <a:t>버튼을 누를 경우 </a:t>
-            </a:r>
-            <a:r>
-              <a:rPr lang="en-US" altLang="ko-KR" dirty="0"/>
-              <a:t>: 4</a:t>
-            </a:r>
-            <a:r>
-              <a:rPr lang="ko-KR" altLang="en-US" dirty="0"/>
-              <a:t>개의 다리가 모두 연결</a:t>
-            </a:r>
-          </a:p>
-        </p:txBody>
-      </p:sp>
-    </p:spTree>
-    <p:extLst>
-      <p:ext uri="{BB962C8B-B14F-4D97-AF65-F5344CB8AC3E}">
-        <p14:creationId xmlns:p14="http://schemas.microsoft.com/office/powerpoint/2010/main" val="117091181"/>
-      </p:ext>
-    </p:extLst>
-  </p:cSld>
-  <p:clrMapOvr>
-    <a:masterClrMapping/>
-  </p:clrMapOvr>
-  <p:timing>
-    <p:tnLst>
-      <p:par>
-        <p:cTn id="1" dur="indefinite" restart="never" nodeType="tmRoot">
-          <p:childTnLst>
-            <p:seq concurrent="1" nextAc="seek">
-              <p:cTn id="2" dur="indefinite" nodeType="mainSeq">
-                <p:childTnLst>
-                  <p:par>
-                    <p:cTn id="3" fill="hold">
-                      <p:stCondLst>
-                        <p:cond delay="indefinite"/>
-                      </p:stCondLst>
-                      <p:childTnLst>
-                        <p:par>
-                          <p:cTn id="4" fill="hold">
-                            <p:stCondLst>
-                              <p:cond delay="0"/>
-                            </p:stCondLst>
-                            <p:childTnLst>
-                              <p:par>
-                                <p:cTn id="5" presetID="42" presetClass="entr" presetSubtype="0" fill="hold" nodeType="clickEffect">
-                                  <p:stCondLst>
-                                    <p:cond delay="0"/>
-                                  </p:stCondLst>
-                                  <p:childTnLst>
-                                    <p:set>
-                                      <p:cBhvr>
-                                        <p:cTn id="6" dur="1" fill="hold">
-                                          <p:stCondLst>
-                                            <p:cond delay="0"/>
-                                          </p:stCondLst>
-                                        </p:cTn>
-                                        <p:tgtEl>
-                                          <p:spTgt spid="8">
-                                            <p:txEl>
-                                              <p:pRg st="0" end="0"/>
-                                            </p:txEl>
-                                          </p:spTgt>
-                                        </p:tgtEl>
-                                        <p:attrNameLst>
-                                          <p:attrName>style.visibility</p:attrName>
-                                        </p:attrNameLst>
-                                      </p:cBhvr>
-                                      <p:to>
-                                        <p:strVal val="visible"/>
-                                      </p:to>
-                                    </p:set>
-                                    <p:animEffect transition="in" filter="fade">
-                                      <p:cBhvr>
-                                        <p:cTn id="7" dur="1000"/>
-                                        <p:tgtEl>
-                                          <p:spTgt spid="8">
-                                            <p:txEl>
-                                              <p:pRg st="0" end="0"/>
-                                            </p:txEl>
-                                          </p:spTgt>
-                                        </p:tgtEl>
-                                      </p:cBhvr>
-                                    </p:animEffect>
-                                    <p:anim calcmode="lin" valueType="num">
-                                      <p:cBhvr>
-                                        <p:cTn id="8" dur="1000" fill="hold"/>
-                                        <p:tgtEl>
-                                          <p:spTgt spid="8">
-                                            <p:txEl>
-                                              <p:pRg st="0" end="0"/>
-                                            </p:txEl>
-                                          </p:spTgt>
-                                        </p:tgtEl>
-                                        <p:attrNameLst>
-                                          <p:attrName>ppt_x</p:attrName>
-                                        </p:attrNameLst>
-                                      </p:cBhvr>
-                                      <p:tavLst>
-                                        <p:tav tm="0">
-                                          <p:val>
-                                            <p:strVal val="#ppt_x"/>
-                                          </p:val>
-                                        </p:tav>
-                                        <p:tav tm="100000">
-                                          <p:val>
-                                            <p:strVal val="#ppt_x"/>
-                                          </p:val>
-                                        </p:tav>
-                                      </p:tavLst>
-                                    </p:anim>
-                                    <p:anim calcmode="lin" valueType="num">
-                                      <p:cBhvr>
-                                        <p:cTn id="9" dur="1000" fill="hold"/>
-                                        <p:tgtEl>
-                                          <p:spTgt spid="8">
-                                            <p:txEl>
-                                              <p:pRg st="0" end="0"/>
-                                            </p:txEl>
-                                          </p:spTgt>
-                                        </p:tgtEl>
-                                        <p:attrNameLst>
-                                          <p:attrName>ppt_y</p:attrName>
-                                        </p:attrNameLst>
-                                      </p:cBhvr>
-                                      <p:tavLst>
-                                        <p:tav tm="0">
-                                          <p:val>
-                                            <p:strVal val="#ppt_y+.1"/>
-                                          </p:val>
-                                        </p:tav>
-                                        <p:tav tm="100000">
-                                          <p:val>
-                                            <p:strVal val="#ppt_y"/>
-                                          </p:val>
-                                        </p:tav>
-                                      </p:tavLst>
-                                    </p:anim>
-                                  </p:childTnLst>
-                                </p:cTn>
-                              </p:par>
-                            </p:childTnLst>
-                          </p:cTn>
-                        </p:par>
-                      </p:childTnLst>
-                    </p:cTn>
-                  </p:par>
-                  <p:par>
-                    <p:cTn id="10" fill="hold">
-                      <p:stCondLst>
-                        <p:cond delay="indefinite"/>
-                      </p:stCondLst>
-                      <p:childTnLst>
-                        <p:par>
-                          <p:cTn id="11" fill="hold">
-                            <p:stCondLst>
-                              <p:cond delay="0"/>
-                            </p:stCondLst>
-                            <p:childTnLst>
-                              <p:par>
-                                <p:cTn id="12" presetID="42" presetClass="entr" presetSubtype="0" fill="hold" nodeType="clickEffect">
-                                  <p:stCondLst>
-                                    <p:cond delay="0"/>
-                                  </p:stCondLst>
-                                  <p:childTnLst>
-                                    <p:set>
-                                      <p:cBhvr>
-                                        <p:cTn id="13" dur="1" fill="hold">
-                                          <p:stCondLst>
-                                            <p:cond delay="0"/>
-                                          </p:stCondLst>
-                                        </p:cTn>
-                                        <p:tgtEl>
-                                          <p:spTgt spid="8">
-                                            <p:txEl>
-                                              <p:pRg st="1" end="1"/>
-                                            </p:txEl>
-                                          </p:spTgt>
-                                        </p:tgtEl>
-                                        <p:attrNameLst>
-                                          <p:attrName>style.visibility</p:attrName>
-                                        </p:attrNameLst>
-                                      </p:cBhvr>
-                                      <p:to>
-                                        <p:strVal val="visible"/>
-                                      </p:to>
-                                    </p:set>
-                                    <p:animEffect transition="in" filter="fade">
-                                      <p:cBhvr>
-                                        <p:cTn id="14" dur="1000"/>
-                                        <p:tgtEl>
-                                          <p:spTgt spid="8">
-                                            <p:txEl>
-                                              <p:pRg st="1" end="1"/>
-                                            </p:txEl>
-                                          </p:spTgt>
-                                        </p:tgtEl>
-                                      </p:cBhvr>
-                                    </p:animEffect>
-                                    <p:anim calcmode="lin" valueType="num">
-                                      <p:cBhvr>
-                                        <p:cTn id="15" dur="1000" fill="hold"/>
-                                        <p:tgtEl>
-                                          <p:spTgt spid="8">
-                                            <p:txEl>
-                                              <p:pRg st="1" end="1"/>
-                                            </p:txEl>
-                                          </p:spTgt>
-                                        </p:tgtEl>
-                                        <p:attrNameLst>
-                                          <p:attrName>ppt_x</p:attrName>
-                                        </p:attrNameLst>
-                                      </p:cBhvr>
-                                      <p:tavLst>
-                                        <p:tav tm="0">
-                                          <p:val>
-                                            <p:strVal val="#ppt_x"/>
-                                          </p:val>
-                                        </p:tav>
-                                        <p:tav tm="100000">
-                                          <p:val>
-                                            <p:strVal val="#ppt_x"/>
-                                          </p:val>
-                                        </p:tav>
-                                      </p:tavLst>
-                                    </p:anim>
-                                    <p:anim calcmode="lin" valueType="num">
-                                      <p:cBhvr>
-                                        <p:cTn id="16" dur="1000" fill="hold"/>
-                                        <p:tgtEl>
-                                          <p:spTgt spid="8">
-                                            <p:txEl>
-                                              <p:pRg st="1" end="1"/>
-                                            </p:txEl>
-                                          </p:spTgt>
-                                        </p:tgtEl>
-                                        <p:attrNameLst>
-                                          <p:attrName>ppt_y</p:attrName>
-                                        </p:attrNameLst>
-                                      </p:cBhvr>
-                                      <p:tavLst>
-                                        <p:tav tm="0">
-                                          <p:val>
-                                            <p:strVal val="#ppt_y+.1"/>
-                                          </p:val>
-                                        </p:tav>
-                                        <p:tav tm="100000">
-                                          <p:val>
-                                            <p:strVal val="#ppt_y"/>
-                                          </p:val>
-                                        </p:tav>
-                                      </p:tavLst>
-                                    </p:anim>
-                                  </p:childTnLst>
-                                </p:cTn>
-                              </p:par>
-                            </p:childTnLst>
-                          </p:cTn>
-                        </p:par>
-                      </p:childTnLst>
-                    </p:cTn>
-                  </p:par>
-                </p:childTnLst>
-              </p:cTn>
-              <p:prevCondLst>
-                <p:cond evt="onPrev" delay="0">
-                  <p:tgtEl>
-                    <p:sldTgt/>
-                  </p:tgtEl>
-                </p:cond>
-              </p:prevCondLst>
-              <p:nextCondLst>
-                <p:cond evt="onNext" delay="0">
-                  <p:tgtEl>
-                    <p:sldTgt/>
-                  </p:tgtEl>
-                </p:cond>
-              </p:nextCondLst>
-            </p:seq>
-          </p:childTnLst>
-        </p:cTn>
-      </p:par>
-    </p:tnLst>
-  </p:timing>
-</p:sld>
-</file>
-
-<file path=ppt/slides/slide6.xml><?xml version="1.0" encoding="utf-8"?>
-<p:sld xmlns:a="http://schemas.openxmlformats.org/drawingml/2006/main" xmlns:r="http://schemas.openxmlformats.org/officeDocument/2006/relationships" xmlns:p="http://schemas.openxmlformats.org/presentationml/2006/main">
-  <p:cSld>
-    <p:spTree>
-      <p:nvGrpSpPr>
-        <p:cNvPr id="1" name=""/>
-        <p:cNvGrpSpPr/>
-        <p:nvPr/>
-      </p:nvGrpSpPr>
-      <p:grpSpPr>
-        <a:xfrm>
-          <a:off x="0" y="0"/>
-          <a:ext cx="0" cy="0"/>
-          <a:chOff x="0" y="0"/>
-          <a:chExt cx="0" cy="0"/>
-        </a:xfrm>
-      </p:grpSpPr>
-      <p:sp>
-        <p:nvSpPr>
           <p:cNvPr id="13" name="내용 개체 틀 2"/>
           <p:cNvSpPr txBox="1">
             <a:spLocks/>
@@ -11268,22 +10268,21 @@
             </a:lvl9pPr>
           </a:lstStyle>
           <a:p>
-            <a:endParaRPr lang="en-US" altLang="ko-KR" dirty="0" smtClean="0"/>
-          </a:p>
-          <a:p>
-            <a:r>
-              <a:rPr lang="en-US" altLang="ko-KR" dirty="0" smtClean="0"/>
+            <a:endParaRPr lang="en-US" altLang="ko-KR" dirty="0"/>
+          </a:p>
+          <a:p>
+            <a:r>
+              <a:rPr lang="en-US" altLang="ko-KR" dirty="0"/>
               <a:t>GND(LOW)  </a:t>
             </a:r>
             <a:r>
-              <a:rPr lang="ko-KR" altLang="en-US" dirty="0" smtClean="0"/>
+              <a:rPr lang="ko-KR" altLang="en-US" dirty="0"/>
               <a:t>읽기  </a:t>
             </a:r>
             <a:r>
-              <a:rPr lang="en-US" altLang="ko-KR" dirty="0" smtClean="0"/>
+              <a:rPr lang="en-US" altLang="ko-KR" dirty="0"/>
               <a:t> </a:t>
             </a:r>
-            <a:endParaRPr lang="en-US" altLang="ko-KR" dirty="0"/>
           </a:p>
           <a:p>
             <a:pPr lvl="1"/>
@@ -11318,7 +10317,7 @@
           <p:cNvPr id="18" name="그림 17" descr="전자기기, 회로이(가) 표시된 사진&#10;&#10;자동 생성된 설명">
             <a:extLst>
               <a:ext uri="{FF2B5EF4-FFF2-40B4-BE49-F238E27FC236}">
-                <a16:creationId xmlns:a16="http://schemas.microsoft.com/office/drawing/2014/main" xmlns="" id="{D7BDF426-0F3C-494A-8C9F-2D3B68D6B9DA}"/>
+                <a16:creationId xmlns:a16="http://schemas.microsoft.com/office/drawing/2014/main" id="{D7BDF426-0F3C-494A-8C9F-2D3B68D6B9DA}"/>
               </a:ext>
             </a:extLst>
           </p:cNvPr>
@@ -11390,7 +10389,7 @@
           </a:lstStyle>
           <a:p>
             <a:r>
-              <a:rPr lang="ko-KR" altLang="en-US" smtClean="0"/>
+              <a:rPr lang="ko-KR" altLang="en-US"/>
               <a:t>디지털 입력</a:t>
             </a:r>
             <a:endParaRPr lang="ko-KR" altLang="en-US" dirty="0"/>
@@ -11410,7 +10409,7 @@
 </p:sld>
 </file>
 
-<file path=ppt/slides/slide7.xml><?xml version="1.0" encoding="utf-8"?>
+<file path=ppt/slides/slide6.xml><?xml version="1.0" encoding="utf-8"?>
 <p:sld xmlns:a="http://schemas.openxmlformats.org/drawingml/2006/main" xmlns:r="http://schemas.openxmlformats.org/officeDocument/2006/relationships" xmlns:p="http://schemas.openxmlformats.org/presentationml/2006/main">
   <p:cSld>
     <p:spTree>
@@ -11613,15 +10612,15 @@
           <a:p>
             <a:pPr lvl="1"/>
             <a:r>
-              <a:rPr lang="ko-KR" altLang="en-US" dirty="0" smtClean="0"/>
+              <a:rPr lang="ko-KR" altLang="en-US" dirty="0"/>
               <a:t>스케치</a:t>
             </a:r>
             <a:r>
-              <a:rPr lang="en-US" altLang="ko-KR" dirty="0" smtClean="0"/>
+              <a:rPr lang="en-US" altLang="ko-KR" dirty="0"/>
               <a:t>, </a:t>
             </a:r>
             <a:r>
-              <a:rPr lang="ko-KR" altLang="en-US" dirty="0" smtClean="0"/>
+              <a:rPr lang="ko-KR" altLang="en-US" dirty="0"/>
               <a:t>시리얼 모니터 확인</a:t>
             </a:r>
             <a:endParaRPr lang="en-US" altLang="ko-KR" dirty="0"/>
@@ -11637,7 +10636,7 @@
           <p:cNvPr id="3" name="그림 2" descr="스크린샷이(가) 표시된 사진&#10;&#10;자동 생성된 설명">
             <a:extLst>
               <a:ext uri="{FF2B5EF4-FFF2-40B4-BE49-F238E27FC236}">
-                <a16:creationId xmlns:a16="http://schemas.microsoft.com/office/drawing/2014/main" xmlns="" id="{0ECAF3A8-C7C9-B74C-8D7D-50DCC1DCD352}"/>
+                <a16:creationId xmlns:a16="http://schemas.microsoft.com/office/drawing/2014/main" id="{0ECAF3A8-C7C9-B74C-8D7D-50DCC1DCD352}"/>
               </a:ext>
             </a:extLst>
           </p:cNvPr>
@@ -11681,7 +10680,7 @@
 </p:sld>
 </file>
 
-<file path=ppt/slides/slide8.xml><?xml version="1.0" encoding="utf-8"?>
+<file path=ppt/slides/slide7.xml><?xml version="1.0" encoding="utf-8"?>
 <p:sld xmlns:a="http://schemas.openxmlformats.org/drawingml/2006/main" xmlns:r="http://schemas.openxmlformats.org/officeDocument/2006/relationships" xmlns:p="http://schemas.openxmlformats.org/presentationml/2006/main">
   <p:cSld>
     <p:spTree>
@@ -11883,11 +10882,11 @@
           </a:lstStyle>
           <a:p>
             <a:r>
-              <a:rPr lang="en-US" altLang="ko-KR" dirty="0" smtClean="0"/>
+              <a:rPr lang="en-US" altLang="ko-KR" dirty="0"/>
               <a:t>5V(LOW) </a:t>
             </a:r>
             <a:r>
-              <a:rPr lang="ko-KR" altLang="en-US" dirty="0" smtClean="0"/>
+              <a:rPr lang="ko-KR" altLang="en-US" dirty="0"/>
               <a:t>읽기 </a:t>
             </a:r>
             <a:endParaRPr lang="en-US" altLang="ko-KR" dirty="0"/>
@@ -11925,7 +10924,7 @@
           <p:cNvPr id="3" name="그림 2" descr="전자기기, 회로이(가) 표시된 사진&#10;&#10;자동 생성된 설명">
             <a:extLst>
               <a:ext uri="{FF2B5EF4-FFF2-40B4-BE49-F238E27FC236}">
-                <a16:creationId xmlns:a16="http://schemas.microsoft.com/office/drawing/2014/main" xmlns="" id="{BD1E7784-0FC5-4241-BC94-8AE6CE466EE7}"/>
+                <a16:creationId xmlns:a16="http://schemas.microsoft.com/office/drawing/2014/main" id="{BD1E7784-0FC5-4241-BC94-8AE6CE466EE7}"/>
               </a:ext>
             </a:extLst>
           </p:cNvPr>
@@ -11968,7 +10967,7 @@
 </p:sld>
 </file>
 
-<file path=ppt/slides/slide9.xml><?xml version="1.0" encoding="utf-8"?>
+<file path=ppt/slides/slide8.xml><?xml version="1.0" encoding="utf-8"?>
 <p:sld xmlns:a="http://schemas.openxmlformats.org/drawingml/2006/main" xmlns:r="http://schemas.openxmlformats.org/officeDocument/2006/relationships" xmlns:p="http://schemas.openxmlformats.org/presentationml/2006/main">
   <p:cSld>
     <p:spTree>
@@ -11990,7 +10989,7 @@
           <p:cNvPr id="4" name="그림 3" descr="스크린샷이(가) 표시된 사진&#10;&#10;자동 생성된 설명">
             <a:extLst>
               <a:ext uri="{FF2B5EF4-FFF2-40B4-BE49-F238E27FC236}">
-                <a16:creationId xmlns:a16="http://schemas.microsoft.com/office/drawing/2014/main" xmlns="" id="{7F132A92-9B9D-1945-A66C-A7F72DCE0E85}"/>
+                <a16:creationId xmlns:a16="http://schemas.microsoft.com/office/drawing/2014/main" id="{7F132A92-9B9D-1945-A66C-A7F72DCE0E85}"/>
               </a:ext>
             </a:extLst>
           </p:cNvPr>
@@ -12207,15 +11206,15 @@
           <a:p>
             <a:pPr lvl="1"/>
             <a:r>
-              <a:rPr lang="ko-KR" altLang="en-US" dirty="0" smtClean="0"/>
+              <a:rPr lang="ko-KR" altLang="en-US" dirty="0"/>
               <a:t>스케치</a:t>
             </a:r>
             <a:r>
-              <a:rPr lang="en-US" altLang="ko-KR" dirty="0" smtClean="0"/>
+              <a:rPr lang="en-US" altLang="ko-KR" dirty="0"/>
               <a:t>, </a:t>
             </a:r>
             <a:r>
-              <a:rPr lang="ko-KR" altLang="en-US" dirty="0" smtClean="0"/>
+              <a:rPr lang="ko-KR" altLang="en-US" dirty="0"/>
               <a:t>시리얼 모니터 확인</a:t>
             </a:r>
             <a:endParaRPr lang="en-US" altLang="ko-KR" dirty="0"/>
@@ -12230,6 +11229,354 @@
     <p:extLst>
       <p:ext uri="{BB962C8B-B14F-4D97-AF65-F5344CB8AC3E}">
         <p14:creationId xmlns:p14="http://schemas.microsoft.com/office/powerpoint/2010/main" val="2954543412"/>
+      </p:ext>
+    </p:extLst>
+  </p:cSld>
+  <p:clrMapOvr>
+    <a:masterClrMapping/>
+  </p:clrMapOvr>
+</p:sld>
+</file>
+
+<file path=ppt/slides/slide9.xml><?xml version="1.0" encoding="utf-8"?>
+<p:sld xmlns:a="http://schemas.openxmlformats.org/drawingml/2006/main" xmlns:r="http://schemas.openxmlformats.org/officeDocument/2006/relationships" xmlns:p="http://schemas.openxmlformats.org/presentationml/2006/main">
+  <p:cSld>
+    <p:spTree>
+      <p:nvGrpSpPr>
+        <p:cNvPr id="1" name=""/>
+        <p:cNvGrpSpPr/>
+        <p:nvPr/>
+      </p:nvGrpSpPr>
+      <p:grpSpPr>
+        <a:xfrm>
+          <a:off x="0" y="0"/>
+          <a:ext cx="0" cy="0"/>
+          <a:chOff x="0" y="0"/>
+          <a:chExt cx="0" cy="0"/>
+        </a:xfrm>
+      </p:grpSpPr>
+      <p:sp>
+        <p:nvSpPr>
+          <p:cNvPr id="8" name="내용 개체 틀 2"/>
+          <p:cNvSpPr txBox="1">
+            <a:spLocks/>
+          </p:cNvSpPr>
+          <p:nvPr/>
+        </p:nvSpPr>
+        <p:spPr>
+          <a:xfrm>
+            <a:off x="82128" y="1130212"/>
+            <a:ext cx="8239125" cy="1318121"/>
+          </a:xfrm>
+          <a:prstGeom prst="rect">
+            <a:avLst/>
+          </a:prstGeom>
+        </p:spPr>
+        <p:txBody>
+          <a:bodyPr/>
+          <a:lstStyle>
+            <a:lvl1pPr marL="228600" indent="-228600" algn="l" defTabSz="914400" rtl="0" eaLnBrk="1" latinLnBrk="1" hangingPunct="1">
+              <a:lnSpc>
+                <a:spcPct val="90000"/>
+              </a:lnSpc>
+              <a:spcBef>
+                <a:spcPts val="1000"/>
+              </a:spcBef>
+              <a:buFont typeface="Arial" panose="020B0604020202020204" pitchFamily="34" charset="0"/>
+              <a:buChar char="•"/>
+              <a:defRPr sz="2800" kern="1200">
+                <a:solidFill>
+                  <a:schemeClr val="tx1"/>
+                </a:solidFill>
+                <a:latin typeface="+mn-lt"/>
+                <a:ea typeface="+mn-ea"/>
+                <a:cs typeface="+mn-cs"/>
+              </a:defRPr>
+            </a:lvl1pPr>
+            <a:lvl2pPr marL="685800" indent="-228600" algn="l" defTabSz="914400" rtl="0" eaLnBrk="1" latinLnBrk="1" hangingPunct="1">
+              <a:lnSpc>
+                <a:spcPct val="90000"/>
+              </a:lnSpc>
+              <a:spcBef>
+                <a:spcPts val="500"/>
+              </a:spcBef>
+              <a:buFont typeface="Arial" panose="020B0604020202020204" pitchFamily="34" charset="0"/>
+              <a:buChar char="•"/>
+              <a:defRPr sz="2400" kern="1200">
+                <a:solidFill>
+                  <a:schemeClr val="tx1"/>
+                </a:solidFill>
+                <a:latin typeface="+mn-lt"/>
+                <a:ea typeface="+mn-ea"/>
+                <a:cs typeface="+mn-cs"/>
+              </a:defRPr>
+            </a:lvl2pPr>
+            <a:lvl3pPr marL="1143000" indent="-228600" algn="l" defTabSz="914400" rtl="0" eaLnBrk="1" latinLnBrk="1" hangingPunct="1">
+              <a:lnSpc>
+                <a:spcPct val="90000"/>
+              </a:lnSpc>
+              <a:spcBef>
+                <a:spcPts val="500"/>
+              </a:spcBef>
+              <a:buFont typeface="Arial" panose="020B0604020202020204" pitchFamily="34" charset="0"/>
+              <a:buChar char="•"/>
+              <a:defRPr sz="2000" kern="1200">
+                <a:solidFill>
+                  <a:schemeClr val="tx1"/>
+                </a:solidFill>
+                <a:latin typeface="+mn-lt"/>
+                <a:ea typeface="+mn-ea"/>
+                <a:cs typeface="+mn-cs"/>
+              </a:defRPr>
+            </a:lvl3pPr>
+            <a:lvl4pPr marL="1600200" indent="-228600" algn="l" defTabSz="914400" rtl="0" eaLnBrk="1" latinLnBrk="1" hangingPunct="1">
+              <a:lnSpc>
+                <a:spcPct val="90000"/>
+              </a:lnSpc>
+              <a:spcBef>
+                <a:spcPts val="500"/>
+              </a:spcBef>
+              <a:buFont typeface="Arial" panose="020B0604020202020204" pitchFamily="34" charset="0"/>
+              <a:buChar char="•"/>
+              <a:defRPr sz="1800" kern="1200">
+                <a:solidFill>
+                  <a:schemeClr val="tx1"/>
+                </a:solidFill>
+                <a:latin typeface="+mn-lt"/>
+                <a:ea typeface="+mn-ea"/>
+                <a:cs typeface="+mn-cs"/>
+              </a:defRPr>
+            </a:lvl4pPr>
+            <a:lvl5pPr marL="2057400" indent="-228600" algn="l" defTabSz="914400" rtl="0" eaLnBrk="1" latinLnBrk="1" hangingPunct="1">
+              <a:lnSpc>
+                <a:spcPct val="90000"/>
+              </a:lnSpc>
+              <a:spcBef>
+                <a:spcPts val="500"/>
+              </a:spcBef>
+              <a:buFont typeface="Arial" panose="020B0604020202020204" pitchFamily="34" charset="0"/>
+              <a:buChar char="•"/>
+              <a:defRPr sz="1800" kern="1200">
+                <a:solidFill>
+                  <a:schemeClr val="tx1"/>
+                </a:solidFill>
+                <a:latin typeface="+mn-lt"/>
+                <a:ea typeface="+mn-ea"/>
+                <a:cs typeface="+mn-cs"/>
+              </a:defRPr>
+            </a:lvl5pPr>
+            <a:lvl6pPr marL="2514600" indent="-228600" algn="l" defTabSz="914400" rtl="0" eaLnBrk="1" latinLnBrk="1" hangingPunct="1">
+              <a:lnSpc>
+                <a:spcPct val="90000"/>
+              </a:lnSpc>
+              <a:spcBef>
+                <a:spcPts val="500"/>
+              </a:spcBef>
+              <a:buFont typeface="Arial" panose="020B0604020202020204" pitchFamily="34" charset="0"/>
+              <a:buChar char="•"/>
+              <a:defRPr sz="1800" kern="1200">
+                <a:solidFill>
+                  <a:schemeClr val="tx1"/>
+                </a:solidFill>
+                <a:latin typeface="+mn-lt"/>
+                <a:ea typeface="+mn-ea"/>
+                <a:cs typeface="+mn-cs"/>
+              </a:defRPr>
+            </a:lvl6pPr>
+            <a:lvl7pPr marL="2971800" indent="-228600" algn="l" defTabSz="914400" rtl="0" eaLnBrk="1" latinLnBrk="1" hangingPunct="1">
+              <a:lnSpc>
+                <a:spcPct val="90000"/>
+              </a:lnSpc>
+              <a:spcBef>
+                <a:spcPts val="500"/>
+              </a:spcBef>
+              <a:buFont typeface="Arial" panose="020B0604020202020204" pitchFamily="34" charset="0"/>
+              <a:buChar char="•"/>
+              <a:defRPr sz="1800" kern="1200">
+                <a:solidFill>
+                  <a:schemeClr val="tx1"/>
+                </a:solidFill>
+                <a:latin typeface="+mn-lt"/>
+                <a:ea typeface="+mn-ea"/>
+                <a:cs typeface="+mn-cs"/>
+              </a:defRPr>
+            </a:lvl7pPr>
+            <a:lvl8pPr marL="3429000" indent="-228600" algn="l" defTabSz="914400" rtl="0" eaLnBrk="1" latinLnBrk="1" hangingPunct="1">
+              <a:lnSpc>
+                <a:spcPct val="90000"/>
+              </a:lnSpc>
+              <a:spcBef>
+                <a:spcPts val="500"/>
+              </a:spcBef>
+              <a:buFont typeface="Arial" panose="020B0604020202020204" pitchFamily="34" charset="0"/>
+              <a:buChar char="•"/>
+              <a:defRPr sz="1800" kern="1200">
+                <a:solidFill>
+                  <a:schemeClr val="tx1"/>
+                </a:solidFill>
+                <a:latin typeface="+mn-lt"/>
+                <a:ea typeface="+mn-ea"/>
+                <a:cs typeface="+mn-cs"/>
+              </a:defRPr>
+            </a:lvl8pPr>
+            <a:lvl9pPr marL="3886200" indent="-228600" algn="l" defTabSz="914400" rtl="0" eaLnBrk="1" latinLnBrk="1" hangingPunct="1">
+              <a:lnSpc>
+                <a:spcPct val="90000"/>
+              </a:lnSpc>
+              <a:spcBef>
+                <a:spcPts val="500"/>
+              </a:spcBef>
+              <a:buFont typeface="Arial" panose="020B0604020202020204" pitchFamily="34" charset="0"/>
+              <a:buChar char="•"/>
+              <a:defRPr sz="1800" kern="1200">
+                <a:solidFill>
+                  <a:schemeClr val="tx1"/>
+                </a:solidFill>
+                <a:latin typeface="+mn-lt"/>
+                <a:ea typeface="+mn-ea"/>
+                <a:cs typeface="+mn-cs"/>
+              </a:defRPr>
+            </a:lvl9pPr>
+          </a:lstStyle>
+          <a:p>
+            <a:pPr lvl="1">
+              <a:lnSpc>
+                <a:spcPct val="100000"/>
+              </a:lnSpc>
+            </a:pPr>
+            <a:r>
+              <a:rPr lang="ko-KR" altLang="en-US" dirty="0"/>
+              <a:t>불완전한 회로 연결</a:t>
+            </a:r>
+            <a:r>
+              <a:rPr lang="en-US" altLang="ko-KR" dirty="0"/>
+              <a:t>, </a:t>
+            </a:r>
+            <a:r>
+              <a:rPr lang="ko-KR" altLang="en-US" dirty="0"/>
+              <a:t>주변의 자기장 등 영향으로 불규칙한 신호</a:t>
+            </a:r>
+            <a:r>
+              <a:rPr lang="en-US" altLang="ko-KR" dirty="0"/>
+              <a:t>(</a:t>
+            </a:r>
+            <a:r>
+              <a:rPr lang="ko-KR" altLang="en-US" dirty="0" err="1"/>
+              <a:t>노이즈</a:t>
+            </a:r>
+            <a:r>
+              <a:rPr lang="en-US" altLang="ko-KR" dirty="0"/>
+              <a:t>) </a:t>
+            </a:r>
+            <a:r>
+              <a:rPr lang="ko-KR" altLang="en-US" dirty="0"/>
+              <a:t>발생 </a:t>
+            </a:r>
+            <a:r>
+              <a:rPr lang="en-US" altLang="ko-KR" dirty="0"/>
+              <a:t>: 4</a:t>
+            </a:r>
+            <a:r>
+              <a:rPr lang="ko-KR" altLang="en-US" dirty="0"/>
+              <a:t>번 핀</a:t>
+            </a:r>
+          </a:p>
+          <a:p>
+            <a:pPr lvl="1"/>
+            <a:endParaRPr lang="en-US" altLang="ko-KR" dirty="0"/>
+          </a:p>
+        </p:txBody>
+      </p:sp>
+      <p:sp>
+        <p:nvSpPr>
+          <p:cNvPr id="9" name="제목 1"/>
+          <p:cNvSpPr txBox="1">
+            <a:spLocks/>
+          </p:cNvSpPr>
+          <p:nvPr/>
+        </p:nvSpPr>
+        <p:spPr>
+          <a:xfrm>
+            <a:off x="628650" y="365127"/>
+            <a:ext cx="8237444" cy="898898"/>
+          </a:xfrm>
+          <a:prstGeom prst="rect">
+            <a:avLst/>
+          </a:prstGeom>
+        </p:spPr>
+        <p:txBody>
+          <a:bodyPr>
+            <a:normAutofit/>
+          </a:bodyPr>
+          <a:lstStyle>
+            <a:lvl1pPr algn="l" defTabSz="914400" rtl="0" eaLnBrk="1" latinLnBrk="1" hangingPunct="1">
+              <a:lnSpc>
+                <a:spcPct val="90000"/>
+              </a:lnSpc>
+              <a:spcBef>
+                <a:spcPct val="0"/>
+              </a:spcBef>
+              <a:buNone/>
+              <a:defRPr sz="4400" kern="1200">
+                <a:solidFill>
+                  <a:schemeClr val="tx1"/>
+                </a:solidFill>
+                <a:latin typeface="+mj-lt"/>
+                <a:ea typeface="+mj-ea"/>
+                <a:cs typeface="+mj-cs"/>
+              </a:defRPr>
+            </a:lvl1pPr>
+          </a:lstStyle>
+          <a:p>
+            <a:r>
+              <a:rPr lang="ko-KR" altLang="en-US" dirty="0" err="1"/>
+              <a:t>풀로팅</a:t>
+            </a:r>
+            <a:r>
+              <a:rPr lang="en-US" altLang="ko-KR" dirty="0"/>
+              <a:t>(floating) </a:t>
+            </a:r>
+            <a:r>
+              <a:rPr lang="ko-KR" altLang="en-US" dirty="0"/>
+              <a:t>현상</a:t>
+            </a:r>
+          </a:p>
+        </p:txBody>
+      </p:sp>
+      <p:pic>
+        <p:nvPicPr>
+          <p:cNvPr id="3" name="그림 2"/>
+          <p:cNvPicPr>
+            <a:picLocks noChangeAspect="1"/>
+          </p:cNvPicPr>
+          <p:nvPr/>
+        </p:nvPicPr>
+        <p:blipFill>
+          <a:blip r:embed="rId2">
+            <a:extLst>
+              <a:ext uri="{28A0092B-C50C-407E-A947-70E740481C1C}">
+                <a14:useLocalDpi xmlns:a14="http://schemas.microsoft.com/office/drawing/2010/main" val="0"/>
+              </a:ext>
+            </a:extLst>
+          </a:blip>
+          <a:stretch>
+            <a:fillRect/>
+          </a:stretch>
+        </p:blipFill>
+        <p:spPr>
+          <a:xfrm>
+            <a:off x="1131779" y="2553613"/>
+            <a:ext cx="6667500" cy="2990850"/>
+          </a:xfrm>
+          <a:prstGeom prst="rect">
+            <a:avLst/>
+          </a:prstGeom>
+        </p:spPr>
+      </p:pic>
+    </p:spTree>
+    <p:extLst>
+      <p:ext uri="{BB962C8B-B14F-4D97-AF65-F5344CB8AC3E}">
+        <p14:creationId xmlns:p14="http://schemas.microsoft.com/office/powerpoint/2010/main" val="1956551744"/>
       </p:ext>
     </p:extLst>
   </p:cSld>

</xml_diff>